<commit_message>
No more fancy string numbers and stuff
</commit_message>
<xml_diff>
--- a/Week2/Week 2 ALV_Boom.pptx
+++ b/Week2/Week 2 ALV_Boom.pptx
@@ -5,7 +5,7 @@
     <p:sldMasterId id="2147483660" r:id="rId1"/>
   </p:sldMasterIdLst>
   <p:notesMasterIdLst>
-    <p:notesMasterId r:id="rId9"/>
+    <p:notesMasterId r:id="rId8"/>
   </p:notesMasterIdLst>
   <p:sldIdLst>
     <p:sldId id="256" r:id="rId2"/>
@@ -13,8 +13,7 @@
     <p:sldId id="258" r:id="rId4"/>
     <p:sldId id="259" r:id="rId5"/>
     <p:sldId id="260" r:id="rId6"/>
-    <p:sldId id="261" r:id="rId7"/>
-    <p:sldId id="262" r:id="rId8"/>
+    <p:sldId id="262" r:id="rId7"/>
   </p:sldIdLst>
   <p:sldSz cx="9144000" cy="6858000" type="screen4x3"/>
   <p:notesSz cx="6858000" cy="9144000"/>
@@ -115,7 +114,7 @@
   </p:defaultTextStyle>
   <p:extLst>
     <p:ext uri="{EFAFB233-063F-42B5-8137-9DF3F51BA10A}">
-      <p15:sldGuideLst xmlns:p15="http://schemas.microsoft.com/office/powerpoint/2012/main">
+      <p15:sldGuideLst xmlns:p15="http://schemas.microsoft.com/office/powerpoint/2012/main" xmlns="">
         <p15:guide id="1" orient="horz" pos="2160">
           <p15:clr>
             <a:srgbClr val="A4A3A4"/>
@@ -214,7 +213,7 @@
           <a:p>
             <a:fld id="{E62C35BB-CE26-44D7-B5D9-25A8FB5F8715}" type="datetimeFigureOut">
               <a:rPr lang="nl-NL" smtClean="0"/>
-              <a:t>22-12-2015</a:t>
+              <a:t>7-1-2016</a:t>
             </a:fld>
             <a:endParaRPr lang="nl-NL"/>
           </a:p>
@@ -1191,7 +1190,7 @@
           <a:p>
             <a:fld id="{92CFB954-93AE-443C-9105-0400A69CD1D8}" type="datetimeFigureOut">
               <a:rPr lang="nl-NL" smtClean="0"/>
-              <a:t>22-12-2015</a:t>
+              <a:t>7-1-2016</a:t>
             </a:fld>
             <a:endParaRPr lang="nl-NL"/>
           </a:p>
@@ -1387,7 +1386,7 @@
           <a:p>
             <a:fld id="{92CFB954-93AE-443C-9105-0400A69CD1D8}" type="datetimeFigureOut">
               <a:rPr lang="nl-NL" smtClean="0"/>
-              <a:t>22-12-2015</a:t>
+              <a:t>7-1-2016</a:t>
             </a:fld>
             <a:endParaRPr lang="nl-NL"/>
           </a:p>
@@ -1572,7 +1571,7 @@
           <a:p>
             <a:fld id="{92CFB954-93AE-443C-9105-0400A69CD1D8}" type="datetimeFigureOut">
               <a:rPr lang="nl-NL" smtClean="0"/>
-              <a:t>22-12-2015</a:t>
+              <a:t>7-1-2016</a:t>
             </a:fld>
             <a:endParaRPr lang="nl-NL"/>
           </a:p>
@@ -1722,7 +1721,7 @@
           <a:p>
             <a:fld id="{92CFB954-93AE-443C-9105-0400A69CD1D8}" type="datetimeFigureOut">
               <a:rPr lang="nl-NL" smtClean="0"/>
-              <a:t>22-12-2015</a:t>
+              <a:t>7-1-2016</a:t>
             </a:fld>
             <a:endParaRPr lang="nl-NL"/>
           </a:p>
@@ -1977,7 +1976,7 @@
           <a:p>
             <a:fld id="{92CFB954-93AE-443C-9105-0400A69CD1D8}" type="datetimeFigureOut">
               <a:rPr lang="nl-NL" smtClean="0"/>
-              <a:t>22-12-2015</a:t>
+              <a:t>7-1-2016</a:t>
             </a:fld>
             <a:endParaRPr lang="nl-NL"/>
           </a:p>
@@ -2386,7 +2385,7 @@
           <a:p>
             <a:fld id="{92CFB954-93AE-443C-9105-0400A69CD1D8}" type="datetimeFigureOut">
               <a:rPr lang="nl-NL" smtClean="0"/>
-              <a:t>22-12-2015</a:t>
+              <a:t>7-1-2016</a:t>
             </a:fld>
             <a:endParaRPr lang="nl-NL"/>
           </a:p>
@@ -2832,7 +2831,7 @@
           <a:p>
             <a:fld id="{92CFB954-93AE-443C-9105-0400A69CD1D8}" type="datetimeFigureOut">
               <a:rPr lang="nl-NL" smtClean="0"/>
-              <a:t>22-12-2015</a:t>
+              <a:t>7-1-2016</a:t>
             </a:fld>
             <a:endParaRPr lang="nl-NL"/>
           </a:p>
@@ -2933,7 +2932,7 @@
           <a:p>
             <a:fld id="{92CFB954-93AE-443C-9105-0400A69CD1D8}" type="datetimeFigureOut">
               <a:rPr lang="nl-NL" smtClean="0"/>
-              <a:t>22-12-2015</a:t>
+              <a:t>7-1-2016</a:t>
             </a:fld>
             <a:endParaRPr lang="nl-NL"/>
           </a:p>
@@ -3054,7 +3053,7 @@
           <a:p>
             <a:fld id="{92CFB954-93AE-443C-9105-0400A69CD1D8}" type="datetimeFigureOut">
               <a:rPr lang="nl-NL" smtClean="0"/>
-              <a:t>22-12-2015</a:t>
+              <a:t>7-1-2016</a:t>
             </a:fld>
             <a:endParaRPr lang="nl-NL"/>
           </a:p>
@@ -3328,7 +3327,7 @@
           <a:p>
             <a:fld id="{92CFB954-93AE-443C-9105-0400A69CD1D8}" type="datetimeFigureOut">
               <a:rPr lang="nl-NL" smtClean="0"/>
-              <a:t>22-12-2015</a:t>
+              <a:t>7-1-2016</a:t>
             </a:fld>
             <a:endParaRPr lang="nl-NL"/>
           </a:p>
@@ -3533,7 +3532,7 @@
           <a:p>
             <a:fld id="{92CFB954-93AE-443C-9105-0400A69CD1D8}" type="datetimeFigureOut">
               <a:rPr lang="nl-NL" smtClean="0"/>
-              <a:t>22-12-2015</a:t>
+              <a:t>7-1-2016</a:t>
             </a:fld>
             <a:endParaRPr lang="nl-NL"/>
           </a:p>
@@ -4642,7 +4641,7 @@
           <a:p>
             <a:fld id="{92CFB954-93AE-443C-9105-0400A69CD1D8}" type="datetimeFigureOut">
               <a:rPr lang="nl-NL" smtClean="0"/>
-              <a:t>22-12-2015</a:t>
+              <a:t>7-1-2016</a:t>
             </a:fld>
             <a:endParaRPr lang="nl-NL"/>
           </a:p>
@@ -5066,15 +5065,7 @@
           <a:p>
             <a:r>
               <a:rPr lang="nl-NL" dirty="0" smtClean="0"/>
-              <a:t>Week 2 – </a:t>
-            </a:r>
-            <a:r>
-              <a:rPr lang="nl-NL" dirty="0" smtClean="0"/>
-              <a:t>AVL </a:t>
-            </a:r>
-            <a:r>
-              <a:rPr lang="nl-NL" dirty="0" smtClean="0"/>
-              <a:t>Tree</a:t>
+              <a:t>Week 2 – AVL Tree</a:t>
             </a:r>
             <a:endParaRPr lang="nl-NL" dirty="0"/>
           </a:p>
@@ -5331,11 +5322,7 @@
           <a:p>
             <a:r>
               <a:rPr lang="nl-NL" dirty="0" smtClean="0"/>
-              <a:t>Gestart met een </a:t>
-            </a:r>
-            <a:r>
-              <a:rPr lang="nl-NL" dirty="0" smtClean="0"/>
-              <a:t>node met 2 </a:t>
+              <a:t>Gestart met een node met 2 </a:t>
             </a:r>
             <a:r>
               <a:rPr lang="nl-NL" dirty="0" err="1" smtClean="0"/>
@@ -5383,11 +5370,7 @@
           <a:p>
             <a:r>
               <a:rPr lang="nl-NL" dirty="0" smtClean="0"/>
-              <a:t>De uitvoering van een </a:t>
-            </a:r>
-            <a:r>
-              <a:rPr lang="nl-NL" dirty="0" smtClean="0"/>
-              <a:t>AVL-Tree</a:t>
+              <a:t>De uitvoering van een AVL-Tree</a:t>
             </a:r>
             <a:endParaRPr lang="nl-NL" dirty="0"/>
           </a:p>
@@ -7384,1972 +7367,6 @@
 </file>
 
 <file path=ppt/slides/slide6.xml><?xml version="1.0" encoding="utf-8"?>
-<p:sld xmlns:a="http://schemas.openxmlformats.org/drawingml/2006/main" xmlns:r="http://schemas.openxmlformats.org/officeDocument/2006/relationships" xmlns:p="http://schemas.openxmlformats.org/presentationml/2006/main">
-  <p:cSld>
-    <p:spTree>
-      <p:nvGrpSpPr>
-        <p:cNvPr id="1" name=""/>
-        <p:cNvGrpSpPr/>
-        <p:nvPr/>
-      </p:nvGrpSpPr>
-      <p:grpSpPr>
-        <a:xfrm>
-          <a:off x="0" y="0"/>
-          <a:ext cx="0" cy="0"/>
-          <a:chOff x="0" y="0"/>
-          <a:chExt cx="0" cy="0"/>
-        </a:xfrm>
-      </p:grpSpPr>
-      <p:sp>
-        <p:nvSpPr>
-          <p:cNvPr id="3" name="Titel 2"/>
-          <p:cNvSpPr>
-            <a:spLocks noGrp="1"/>
-          </p:cNvSpPr>
-          <p:nvPr>
-            <p:ph type="title"/>
-          </p:nvPr>
-        </p:nvSpPr>
-        <p:spPr/>
-        <p:txBody>
-          <a:bodyPr/>
-          <a:lstStyle/>
-          <a:p>
-            <a:r>
-              <a:rPr lang="nl-NL" dirty="0" smtClean="0"/>
-              <a:t>Het resultaat</a:t>
-            </a:r>
-            <a:endParaRPr lang="nl-NL" dirty="0"/>
-          </a:p>
-        </p:txBody>
-      </p:sp>
-      <p:sp>
-        <p:nvSpPr>
-          <p:cNvPr id="2" name="Rectangle 1"/>
-          <p:cNvSpPr>
-            <a:spLocks noChangeArrowheads="1"/>
-          </p:cNvSpPr>
-          <p:nvPr/>
-        </p:nvSpPr>
-        <p:spPr bwMode="auto">
-          <a:xfrm>
-            <a:off x="179512" y="1196752"/>
-            <a:ext cx="3108543" cy="2246769"/>
-          </a:xfrm>
-          <a:prstGeom prst="rect">
-            <a:avLst/>
-          </a:prstGeom>
-          <a:solidFill>
-            <a:srgbClr val="FFFFFF"/>
-          </a:solidFill>
-          <a:ln>
-            <a:noFill/>
-          </a:ln>
-          <a:effectLst/>
-          <a:extLst>
-            <a:ext uri="{91240B29-F687-4F45-9708-019B960494DF}">
-              <a14:hiddenLine xmlns:a14="http://schemas.microsoft.com/office/drawing/2010/main" w="9525">
-                <a:solidFill>
-                  <a:schemeClr val="tx1"/>
-                </a:solidFill>
-                <a:miter lim="800000"/>
-                <a:headEnd/>
-                <a:tailEnd/>
-              </a14:hiddenLine>
-            </a:ext>
-            <a:ext uri="{AF507438-7753-43E0-B8FC-AC1667EBCBE1}">
-              <a14:hiddenEffects xmlns:a14="http://schemas.microsoft.com/office/drawing/2010/main">
-                <a:effectLst>
-                  <a:outerShdw dist="35921" dir="2700000" algn="ctr" rotWithShape="0">
-                    <a:schemeClr val="bg2"/>
-                  </a:outerShdw>
-                </a:effectLst>
-              </a14:hiddenEffects>
-            </a:ext>
-          </a:extLst>
-        </p:spPr>
-        <p:txBody>
-          <a:bodyPr vert="horz" wrap="none" lIns="91440" tIns="45720" rIns="91440" bIns="45720" numCol="1" anchor="ctr" anchorCtr="0" compatLnSpc="1">
-            <a:prstTxWarp prst="textNoShape">
-              <a:avLst/>
-            </a:prstTxWarp>
-            <a:spAutoFit/>
-          </a:bodyPr>
-          <a:lstStyle/>
-          <a:p>
-            <a:pPr marL="0" marR="0" lvl="0" indent="0" algn="l" defTabSz="914400" rtl="0" eaLnBrk="0" fontAlgn="base" latinLnBrk="0" hangingPunct="0">
-              <a:lnSpc>
-                <a:spcPct val="100000"/>
-              </a:lnSpc>
-              <a:spcBef>
-                <a:spcPct val="0"/>
-              </a:spcBef>
-              <a:spcAft>
-                <a:spcPct val="0"/>
-              </a:spcAft>
-              <a:buClrTx/>
-              <a:buSzTx/>
-              <a:buFontTx/>
-              <a:buNone/>
-              <a:tabLst/>
-            </a:pPr>
-            <a:r>
-              <a:rPr kumimoji="0" lang="nl-NL" altLang="nl-NL" sz="1000" b="1" i="0" u="none" strike="noStrike" cap="none" normalizeH="0" baseline="0" dirty="0" smtClean="0">
-                <a:ln>
-                  <a:noFill/>
-                </a:ln>
-                <a:solidFill>
-                  <a:srgbClr val="000080"/>
-                </a:solidFill>
-                <a:effectLst/>
-                <a:latin typeface="Courier New" panose="02070309020205020404" pitchFamily="49" charset="0"/>
-                <a:cs typeface="Courier New" panose="02070309020205020404" pitchFamily="49" charset="0"/>
-              </a:rPr>
-              <a:t>public int </a:t>
-            </a:r>
-            <a:r>
-              <a:rPr kumimoji="0" lang="nl-NL" altLang="nl-NL" sz="1000" b="0" i="0" u="none" strike="noStrike" cap="none" normalizeH="0" baseline="0" dirty="0" err="1" smtClean="0">
-                <a:ln>
-                  <a:noFill/>
-                </a:ln>
-                <a:solidFill>
-                  <a:srgbClr val="000000"/>
-                </a:solidFill>
-                <a:effectLst/>
-                <a:latin typeface="Courier New" panose="02070309020205020404" pitchFamily="49" charset="0"/>
-                <a:cs typeface="Courier New" panose="02070309020205020404" pitchFamily="49" charset="0"/>
-              </a:rPr>
-              <a:t>balanceFactor</a:t>
-            </a:r>
-            <a:r>
-              <a:rPr kumimoji="0" lang="nl-NL" altLang="nl-NL" sz="1000" b="0" i="0" u="none" strike="noStrike" cap="none" normalizeH="0" baseline="0" dirty="0" smtClean="0">
-                <a:ln>
-                  <a:noFill/>
-                </a:ln>
-                <a:solidFill>
-                  <a:srgbClr val="000000"/>
-                </a:solidFill>
-                <a:effectLst/>
-                <a:latin typeface="Courier New" panose="02070309020205020404" pitchFamily="49" charset="0"/>
-                <a:cs typeface="Courier New" panose="02070309020205020404" pitchFamily="49" charset="0"/>
-              </a:rPr>
-              <a:t>()</a:t>
-            </a:r>
-            <a:br>
-              <a:rPr kumimoji="0" lang="nl-NL" altLang="nl-NL" sz="1000" b="0" i="0" u="none" strike="noStrike" cap="none" normalizeH="0" baseline="0" dirty="0" smtClean="0">
-                <a:ln>
-                  <a:noFill/>
-                </a:ln>
-                <a:solidFill>
-                  <a:srgbClr val="000000"/>
-                </a:solidFill>
-                <a:effectLst/>
-                <a:latin typeface="Courier New" panose="02070309020205020404" pitchFamily="49" charset="0"/>
-                <a:cs typeface="Courier New" panose="02070309020205020404" pitchFamily="49" charset="0"/>
-              </a:rPr>
-            </a:br>
-            <a:r>
-              <a:rPr kumimoji="0" lang="nl-NL" altLang="nl-NL" sz="1000" b="0" i="0" u="none" strike="noStrike" cap="none" normalizeH="0" baseline="0" dirty="0" smtClean="0">
-                <a:ln>
-                  <a:noFill/>
-                </a:ln>
-                <a:solidFill>
-                  <a:srgbClr val="000000"/>
-                </a:solidFill>
-                <a:effectLst/>
-                <a:latin typeface="Courier New" panose="02070309020205020404" pitchFamily="49" charset="0"/>
-                <a:cs typeface="Courier New" panose="02070309020205020404" pitchFamily="49" charset="0"/>
-              </a:rPr>
-              <a:t>{</a:t>
-            </a:r>
-            <a:br>
-              <a:rPr kumimoji="0" lang="nl-NL" altLang="nl-NL" sz="1000" b="0" i="0" u="none" strike="noStrike" cap="none" normalizeH="0" baseline="0" dirty="0" smtClean="0">
-                <a:ln>
-                  <a:noFill/>
-                </a:ln>
-                <a:solidFill>
-                  <a:srgbClr val="000000"/>
-                </a:solidFill>
-                <a:effectLst/>
-                <a:latin typeface="Courier New" panose="02070309020205020404" pitchFamily="49" charset="0"/>
-                <a:cs typeface="Courier New" panose="02070309020205020404" pitchFamily="49" charset="0"/>
-              </a:rPr>
-            </a:br>
-            <a:r>
-              <a:rPr kumimoji="0" lang="nl-NL" altLang="nl-NL" sz="1000" b="0" i="0" u="none" strike="noStrike" cap="none" normalizeH="0" baseline="0" dirty="0" smtClean="0">
-                <a:ln>
-                  <a:noFill/>
-                </a:ln>
-                <a:solidFill>
-                  <a:srgbClr val="000000"/>
-                </a:solidFill>
-                <a:effectLst/>
-                <a:latin typeface="Courier New" panose="02070309020205020404" pitchFamily="49" charset="0"/>
-                <a:cs typeface="Courier New" panose="02070309020205020404" pitchFamily="49" charset="0"/>
-              </a:rPr>
-              <a:t>    </a:t>
-            </a:r>
-            <a:r>
-              <a:rPr kumimoji="0" lang="nl-NL" altLang="nl-NL" sz="1000" b="1" i="0" u="none" strike="noStrike" cap="none" normalizeH="0" baseline="0" dirty="0" smtClean="0">
-                <a:ln>
-                  <a:noFill/>
-                </a:ln>
-                <a:solidFill>
-                  <a:srgbClr val="000080"/>
-                </a:solidFill>
-                <a:effectLst/>
-                <a:latin typeface="Courier New" panose="02070309020205020404" pitchFamily="49" charset="0"/>
-                <a:cs typeface="Courier New" panose="02070309020205020404" pitchFamily="49" charset="0"/>
-              </a:rPr>
-              <a:t>int </a:t>
-            </a:r>
-            <a:r>
-              <a:rPr kumimoji="0" lang="nl-NL" altLang="nl-NL" sz="1000" b="0" i="0" u="none" strike="noStrike" cap="none" normalizeH="0" baseline="0" dirty="0" err="1" smtClean="0">
-                <a:ln>
-                  <a:noFill/>
-                </a:ln>
-                <a:solidFill>
-                  <a:srgbClr val="000000"/>
-                </a:solidFill>
-                <a:effectLst/>
-                <a:latin typeface="Courier New" panose="02070309020205020404" pitchFamily="49" charset="0"/>
-                <a:cs typeface="Courier New" panose="02070309020205020404" pitchFamily="49" charset="0"/>
-              </a:rPr>
-              <a:t>leftSize</a:t>
-            </a:r>
-            <a:r>
-              <a:rPr kumimoji="0" lang="nl-NL" altLang="nl-NL" sz="1000" b="0" i="0" u="none" strike="noStrike" cap="none" normalizeH="0" baseline="0" dirty="0" smtClean="0">
-                <a:ln>
-                  <a:noFill/>
-                </a:ln>
-                <a:solidFill>
-                  <a:srgbClr val="000000"/>
-                </a:solidFill>
-                <a:effectLst/>
-                <a:latin typeface="Courier New" panose="02070309020205020404" pitchFamily="49" charset="0"/>
-                <a:cs typeface="Courier New" panose="02070309020205020404" pitchFamily="49" charset="0"/>
-              </a:rPr>
-              <a:t> = </a:t>
-            </a:r>
-            <a:r>
-              <a:rPr kumimoji="0" lang="nl-NL" altLang="nl-NL" sz="1000" b="0" i="0" u="none" strike="noStrike" cap="none" normalizeH="0" baseline="0" dirty="0" smtClean="0">
-                <a:ln>
-                  <a:noFill/>
-                </a:ln>
-                <a:solidFill>
-                  <a:srgbClr val="0000FF"/>
-                </a:solidFill>
-                <a:effectLst/>
-                <a:latin typeface="Courier New" panose="02070309020205020404" pitchFamily="49" charset="0"/>
-                <a:cs typeface="Courier New" panose="02070309020205020404" pitchFamily="49" charset="0"/>
-              </a:rPr>
-              <a:t>0</a:t>
-            </a:r>
-            <a:r>
-              <a:rPr kumimoji="0" lang="nl-NL" altLang="nl-NL" sz="1000" b="0" i="0" u="none" strike="noStrike" cap="none" normalizeH="0" baseline="0" dirty="0" smtClean="0">
-                <a:ln>
-                  <a:noFill/>
-                </a:ln>
-                <a:solidFill>
-                  <a:srgbClr val="000000"/>
-                </a:solidFill>
-                <a:effectLst/>
-                <a:latin typeface="Courier New" panose="02070309020205020404" pitchFamily="49" charset="0"/>
-                <a:cs typeface="Courier New" panose="02070309020205020404" pitchFamily="49" charset="0"/>
-              </a:rPr>
-              <a:t>;</a:t>
-            </a:r>
-            <a:br>
-              <a:rPr kumimoji="0" lang="nl-NL" altLang="nl-NL" sz="1000" b="0" i="0" u="none" strike="noStrike" cap="none" normalizeH="0" baseline="0" dirty="0" smtClean="0">
-                <a:ln>
-                  <a:noFill/>
-                </a:ln>
-                <a:solidFill>
-                  <a:srgbClr val="000000"/>
-                </a:solidFill>
-                <a:effectLst/>
-                <a:latin typeface="Courier New" panose="02070309020205020404" pitchFamily="49" charset="0"/>
-                <a:cs typeface="Courier New" panose="02070309020205020404" pitchFamily="49" charset="0"/>
-              </a:rPr>
-            </a:br>
-            <a:r>
-              <a:rPr kumimoji="0" lang="nl-NL" altLang="nl-NL" sz="1000" b="0" i="0" u="none" strike="noStrike" cap="none" normalizeH="0" baseline="0" dirty="0" smtClean="0">
-                <a:ln>
-                  <a:noFill/>
-                </a:ln>
-                <a:solidFill>
-                  <a:srgbClr val="000000"/>
-                </a:solidFill>
-                <a:effectLst/>
-                <a:latin typeface="Courier New" panose="02070309020205020404" pitchFamily="49" charset="0"/>
-                <a:cs typeface="Courier New" panose="02070309020205020404" pitchFamily="49" charset="0"/>
-              </a:rPr>
-              <a:t>    </a:t>
-            </a:r>
-            <a:r>
-              <a:rPr kumimoji="0" lang="nl-NL" altLang="nl-NL" sz="1000" b="1" i="0" u="none" strike="noStrike" cap="none" normalizeH="0" baseline="0" dirty="0" smtClean="0">
-                <a:ln>
-                  <a:noFill/>
-                </a:ln>
-                <a:solidFill>
-                  <a:srgbClr val="000080"/>
-                </a:solidFill>
-                <a:effectLst/>
-                <a:latin typeface="Courier New" panose="02070309020205020404" pitchFamily="49" charset="0"/>
-                <a:cs typeface="Courier New" panose="02070309020205020404" pitchFamily="49" charset="0"/>
-              </a:rPr>
-              <a:t>int </a:t>
-            </a:r>
-            <a:r>
-              <a:rPr kumimoji="0" lang="nl-NL" altLang="nl-NL" sz="1000" b="0" i="0" u="none" strike="noStrike" cap="none" normalizeH="0" baseline="0" dirty="0" err="1" smtClean="0">
-                <a:ln>
-                  <a:noFill/>
-                </a:ln>
-                <a:solidFill>
-                  <a:srgbClr val="000000"/>
-                </a:solidFill>
-                <a:effectLst/>
-                <a:latin typeface="Courier New" panose="02070309020205020404" pitchFamily="49" charset="0"/>
-                <a:cs typeface="Courier New" panose="02070309020205020404" pitchFamily="49" charset="0"/>
-              </a:rPr>
-              <a:t>rightSize</a:t>
-            </a:r>
-            <a:r>
-              <a:rPr kumimoji="0" lang="nl-NL" altLang="nl-NL" sz="1000" b="0" i="0" u="none" strike="noStrike" cap="none" normalizeH="0" baseline="0" dirty="0" smtClean="0">
-                <a:ln>
-                  <a:noFill/>
-                </a:ln>
-                <a:solidFill>
-                  <a:srgbClr val="000000"/>
-                </a:solidFill>
-                <a:effectLst/>
-                <a:latin typeface="Courier New" panose="02070309020205020404" pitchFamily="49" charset="0"/>
-                <a:cs typeface="Courier New" panose="02070309020205020404" pitchFamily="49" charset="0"/>
-              </a:rPr>
-              <a:t> = </a:t>
-            </a:r>
-            <a:r>
-              <a:rPr kumimoji="0" lang="nl-NL" altLang="nl-NL" sz="1000" b="0" i="0" u="none" strike="noStrike" cap="none" normalizeH="0" baseline="0" dirty="0" smtClean="0">
-                <a:ln>
-                  <a:noFill/>
-                </a:ln>
-                <a:solidFill>
-                  <a:srgbClr val="0000FF"/>
-                </a:solidFill>
-                <a:effectLst/>
-                <a:latin typeface="Courier New" panose="02070309020205020404" pitchFamily="49" charset="0"/>
-                <a:cs typeface="Courier New" panose="02070309020205020404" pitchFamily="49" charset="0"/>
-              </a:rPr>
-              <a:t>0</a:t>
-            </a:r>
-            <a:r>
-              <a:rPr kumimoji="0" lang="nl-NL" altLang="nl-NL" sz="1000" b="0" i="0" u="none" strike="noStrike" cap="none" normalizeH="0" baseline="0" dirty="0" smtClean="0">
-                <a:ln>
-                  <a:noFill/>
-                </a:ln>
-                <a:solidFill>
-                  <a:srgbClr val="000000"/>
-                </a:solidFill>
-                <a:effectLst/>
-                <a:latin typeface="Courier New" panose="02070309020205020404" pitchFamily="49" charset="0"/>
-                <a:cs typeface="Courier New" panose="02070309020205020404" pitchFamily="49" charset="0"/>
-              </a:rPr>
-              <a:t>;</a:t>
-            </a:r>
-            <a:br>
-              <a:rPr kumimoji="0" lang="nl-NL" altLang="nl-NL" sz="1000" b="0" i="0" u="none" strike="noStrike" cap="none" normalizeH="0" baseline="0" dirty="0" smtClean="0">
-                <a:ln>
-                  <a:noFill/>
-                </a:ln>
-                <a:solidFill>
-                  <a:srgbClr val="000000"/>
-                </a:solidFill>
-                <a:effectLst/>
-                <a:latin typeface="Courier New" panose="02070309020205020404" pitchFamily="49" charset="0"/>
-                <a:cs typeface="Courier New" panose="02070309020205020404" pitchFamily="49" charset="0"/>
-              </a:rPr>
-            </a:br>
-            <a:r>
-              <a:rPr kumimoji="0" lang="nl-NL" altLang="nl-NL" sz="1000" b="0" i="0" u="none" strike="noStrike" cap="none" normalizeH="0" baseline="0" dirty="0" smtClean="0">
-                <a:ln>
-                  <a:noFill/>
-                </a:ln>
-                <a:solidFill>
-                  <a:srgbClr val="000000"/>
-                </a:solidFill>
-                <a:effectLst/>
-                <a:latin typeface="Courier New" panose="02070309020205020404" pitchFamily="49" charset="0"/>
-                <a:cs typeface="Courier New" panose="02070309020205020404" pitchFamily="49" charset="0"/>
-              </a:rPr>
-              <a:t>    </a:t>
-            </a:r>
-            <a:r>
-              <a:rPr kumimoji="0" lang="nl-NL" altLang="nl-NL" sz="1000" b="1" i="0" u="none" strike="noStrike" cap="none" normalizeH="0" baseline="0" dirty="0" err="1" smtClean="0">
-                <a:ln>
-                  <a:noFill/>
-                </a:ln>
-                <a:solidFill>
-                  <a:srgbClr val="000080"/>
-                </a:solidFill>
-                <a:effectLst/>
-                <a:latin typeface="Courier New" panose="02070309020205020404" pitchFamily="49" charset="0"/>
-                <a:cs typeface="Courier New" panose="02070309020205020404" pitchFamily="49" charset="0"/>
-              </a:rPr>
-              <a:t>if</a:t>
-            </a:r>
-            <a:r>
-              <a:rPr kumimoji="0" lang="nl-NL" altLang="nl-NL" sz="1000" b="1" i="0" u="none" strike="noStrike" cap="none" normalizeH="0" baseline="0" dirty="0" smtClean="0">
-                <a:ln>
-                  <a:noFill/>
-                </a:ln>
-                <a:solidFill>
-                  <a:srgbClr val="000080"/>
-                </a:solidFill>
-                <a:effectLst/>
-                <a:latin typeface="Courier New" panose="02070309020205020404" pitchFamily="49" charset="0"/>
-                <a:cs typeface="Courier New" panose="02070309020205020404" pitchFamily="49" charset="0"/>
-              </a:rPr>
-              <a:t> </a:t>
-            </a:r>
-            <a:r>
-              <a:rPr kumimoji="0" lang="nl-NL" altLang="nl-NL" sz="1000" b="0" i="0" u="none" strike="noStrike" cap="none" normalizeH="0" baseline="0" dirty="0" smtClean="0">
-                <a:ln>
-                  <a:noFill/>
-                </a:ln>
-                <a:solidFill>
-                  <a:srgbClr val="000000"/>
-                </a:solidFill>
-                <a:effectLst/>
-                <a:latin typeface="Courier New" panose="02070309020205020404" pitchFamily="49" charset="0"/>
-                <a:cs typeface="Courier New" panose="02070309020205020404" pitchFamily="49" charset="0"/>
-              </a:rPr>
-              <a:t>(</a:t>
-            </a:r>
-            <a:r>
-              <a:rPr kumimoji="0" lang="nl-NL" altLang="nl-NL" sz="1000" b="1" i="0" u="none" strike="noStrike" cap="none" normalizeH="0" baseline="0" dirty="0" err="1" smtClean="0">
-                <a:ln>
-                  <a:noFill/>
-                </a:ln>
-                <a:solidFill>
-                  <a:srgbClr val="660E7A"/>
-                </a:solidFill>
-                <a:effectLst/>
-                <a:latin typeface="Courier New" panose="02070309020205020404" pitchFamily="49" charset="0"/>
-                <a:cs typeface="Courier New" panose="02070309020205020404" pitchFamily="49" charset="0"/>
-              </a:rPr>
-              <a:t>leftValue</a:t>
-            </a:r>
-            <a:r>
-              <a:rPr kumimoji="0" lang="nl-NL" altLang="nl-NL" sz="1000" b="1" i="0" u="none" strike="noStrike" cap="none" normalizeH="0" baseline="0" dirty="0" smtClean="0">
-                <a:ln>
-                  <a:noFill/>
-                </a:ln>
-                <a:solidFill>
-                  <a:srgbClr val="660E7A"/>
-                </a:solidFill>
-                <a:effectLst/>
-                <a:latin typeface="Courier New" panose="02070309020205020404" pitchFamily="49" charset="0"/>
-                <a:cs typeface="Courier New" panose="02070309020205020404" pitchFamily="49" charset="0"/>
-              </a:rPr>
-              <a:t> </a:t>
-            </a:r>
-            <a:r>
-              <a:rPr kumimoji="0" lang="nl-NL" altLang="nl-NL" sz="1000" b="0" i="0" u="none" strike="noStrike" cap="none" normalizeH="0" baseline="0" dirty="0" smtClean="0">
-                <a:ln>
-                  <a:noFill/>
-                </a:ln>
-                <a:solidFill>
-                  <a:srgbClr val="000000"/>
-                </a:solidFill>
-                <a:effectLst/>
-                <a:latin typeface="Courier New" panose="02070309020205020404" pitchFamily="49" charset="0"/>
-                <a:cs typeface="Courier New" panose="02070309020205020404" pitchFamily="49" charset="0"/>
-              </a:rPr>
-              <a:t>!= </a:t>
-            </a:r>
-            <a:r>
-              <a:rPr kumimoji="0" lang="nl-NL" altLang="nl-NL" sz="1000" b="1" i="0" u="none" strike="noStrike" cap="none" normalizeH="0" baseline="0" dirty="0" err="1" smtClean="0">
-                <a:ln>
-                  <a:noFill/>
-                </a:ln>
-                <a:solidFill>
-                  <a:srgbClr val="000080"/>
-                </a:solidFill>
-                <a:effectLst/>
-                <a:latin typeface="Courier New" panose="02070309020205020404" pitchFamily="49" charset="0"/>
-                <a:cs typeface="Courier New" panose="02070309020205020404" pitchFamily="49" charset="0"/>
-              </a:rPr>
-              <a:t>null</a:t>
-            </a:r>
-            <a:r>
-              <a:rPr kumimoji="0" lang="nl-NL" altLang="nl-NL" sz="1000" b="0" i="0" u="none" strike="noStrike" cap="none" normalizeH="0" baseline="0" dirty="0" smtClean="0">
-                <a:ln>
-                  <a:noFill/>
-                </a:ln>
-                <a:solidFill>
-                  <a:srgbClr val="000000"/>
-                </a:solidFill>
-                <a:effectLst/>
-                <a:latin typeface="Courier New" panose="02070309020205020404" pitchFamily="49" charset="0"/>
-                <a:cs typeface="Courier New" panose="02070309020205020404" pitchFamily="49" charset="0"/>
-              </a:rPr>
-              <a:t>)</a:t>
-            </a:r>
-            <a:br>
-              <a:rPr kumimoji="0" lang="nl-NL" altLang="nl-NL" sz="1000" b="0" i="0" u="none" strike="noStrike" cap="none" normalizeH="0" baseline="0" dirty="0" smtClean="0">
-                <a:ln>
-                  <a:noFill/>
-                </a:ln>
-                <a:solidFill>
-                  <a:srgbClr val="000000"/>
-                </a:solidFill>
-                <a:effectLst/>
-                <a:latin typeface="Courier New" panose="02070309020205020404" pitchFamily="49" charset="0"/>
-                <a:cs typeface="Courier New" panose="02070309020205020404" pitchFamily="49" charset="0"/>
-              </a:rPr>
-            </a:br>
-            <a:r>
-              <a:rPr kumimoji="0" lang="nl-NL" altLang="nl-NL" sz="1000" b="0" i="0" u="none" strike="noStrike" cap="none" normalizeH="0" baseline="0" dirty="0" smtClean="0">
-                <a:ln>
-                  <a:noFill/>
-                </a:ln>
-                <a:solidFill>
-                  <a:srgbClr val="000000"/>
-                </a:solidFill>
-                <a:effectLst/>
-                <a:latin typeface="Courier New" panose="02070309020205020404" pitchFamily="49" charset="0"/>
-                <a:cs typeface="Courier New" panose="02070309020205020404" pitchFamily="49" charset="0"/>
-              </a:rPr>
-              <a:t>    {</a:t>
-            </a:r>
-            <a:br>
-              <a:rPr kumimoji="0" lang="nl-NL" altLang="nl-NL" sz="1000" b="0" i="0" u="none" strike="noStrike" cap="none" normalizeH="0" baseline="0" dirty="0" smtClean="0">
-                <a:ln>
-                  <a:noFill/>
-                </a:ln>
-                <a:solidFill>
-                  <a:srgbClr val="000000"/>
-                </a:solidFill>
-                <a:effectLst/>
-                <a:latin typeface="Courier New" panose="02070309020205020404" pitchFamily="49" charset="0"/>
-                <a:cs typeface="Courier New" panose="02070309020205020404" pitchFamily="49" charset="0"/>
-              </a:rPr>
-            </a:br>
-            <a:r>
-              <a:rPr kumimoji="0" lang="nl-NL" altLang="nl-NL" sz="1000" b="0" i="0" u="none" strike="noStrike" cap="none" normalizeH="0" baseline="0" dirty="0" smtClean="0">
-                <a:ln>
-                  <a:noFill/>
-                </a:ln>
-                <a:solidFill>
-                  <a:srgbClr val="000000"/>
-                </a:solidFill>
-                <a:effectLst/>
-                <a:latin typeface="Courier New" panose="02070309020205020404" pitchFamily="49" charset="0"/>
-                <a:cs typeface="Courier New" panose="02070309020205020404" pitchFamily="49" charset="0"/>
-              </a:rPr>
-              <a:t>        </a:t>
-            </a:r>
-            <a:r>
-              <a:rPr kumimoji="0" lang="nl-NL" altLang="nl-NL" sz="1000" b="0" i="0" u="none" strike="noStrike" cap="none" normalizeH="0" baseline="0" dirty="0" err="1" smtClean="0">
-                <a:ln>
-                  <a:noFill/>
-                </a:ln>
-                <a:solidFill>
-                  <a:srgbClr val="000000"/>
-                </a:solidFill>
-                <a:effectLst/>
-                <a:latin typeface="Courier New" panose="02070309020205020404" pitchFamily="49" charset="0"/>
-                <a:cs typeface="Courier New" panose="02070309020205020404" pitchFamily="49" charset="0"/>
-              </a:rPr>
-              <a:t>leftSize</a:t>
-            </a:r>
-            <a:r>
-              <a:rPr kumimoji="0" lang="nl-NL" altLang="nl-NL" sz="1000" b="0" i="0" u="none" strike="noStrike" cap="none" normalizeH="0" baseline="0" dirty="0" smtClean="0">
-                <a:ln>
-                  <a:noFill/>
-                </a:ln>
-                <a:solidFill>
-                  <a:srgbClr val="000000"/>
-                </a:solidFill>
-                <a:effectLst/>
-                <a:latin typeface="Courier New" panose="02070309020205020404" pitchFamily="49" charset="0"/>
-                <a:cs typeface="Courier New" panose="02070309020205020404" pitchFamily="49" charset="0"/>
-              </a:rPr>
-              <a:t> = </a:t>
-            </a:r>
-            <a:r>
-              <a:rPr kumimoji="0" lang="nl-NL" altLang="nl-NL" sz="1000" b="1" i="0" u="none" strike="noStrike" cap="none" normalizeH="0" baseline="0" dirty="0" err="1" smtClean="0">
-                <a:ln>
-                  <a:noFill/>
-                </a:ln>
-                <a:solidFill>
-                  <a:srgbClr val="660E7A"/>
-                </a:solidFill>
-                <a:effectLst/>
-                <a:latin typeface="Courier New" panose="02070309020205020404" pitchFamily="49" charset="0"/>
-                <a:cs typeface="Courier New" panose="02070309020205020404" pitchFamily="49" charset="0"/>
-              </a:rPr>
-              <a:t>leftValue</a:t>
-            </a:r>
-            <a:r>
-              <a:rPr kumimoji="0" lang="nl-NL" altLang="nl-NL" sz="1000" b="0" i="0" u="none" strike="noStrike" cap="none" normalizeH="0" baseline="0" dirty="0" err="1" smtClean="0">
-                <a:ln>
-                  <a:noFill/>
-                </a:ln>
-                <a:solidFill>
-                  <a:srgbClr val="000000"/>
-                </a:solidFill>
-                <a:effectLst/>
-                <a:latin typeface="Courier New" panose="02070309020205020404" pitchFamily="49" charset="0"/>
-                <a:cs typeface="Courier New" panose="02070309020205020404" pitchFamily="49" charset="0"/>
-              </a:rPr>
-              <a:t>.size</a:t>
-            </a:r>
-            <a:r>
-              <a:rPr kumimoji="0" lang="nl-NL" altLang="nl-NL" sz="1000" b="0" i="0" u="none" strike="noStrike" cap="none" normalizeH="0" baseline="0" dirty="0" smtClean="0">
-                <a:ln>
-                  <a:noFill/>
-                </a:ln>
-                <a:solidFill>
-                  <a:srgbClr val="000000"/>
-                </a:solidFill>
-                <a:effectLst/>
-                <a:latin typeface="Courier New" panose="02070309020205020404" pitchFamily="49" charset="0"/>
-                <a:cs typeface="Courier New" panose="02070309020205020404" pitchFamily="49" charset="0"/>
-              </a:rPr>
-              <a:t>();</a:t>
-            </a:r>
-            <a:br>
-              <a:rPr kumimoji="0" lang="nl-NL" altLang="nl-NL" sz="1000" b="0" i="0" u="none" strike="noStrike" cap="none" normalizeH="0" baseline="0" dirty="0" smtClean="0">
-                <a:ln>
-                  <a:noFill/>
-                </a:ln>
-                <a:solidFill>
-                  <a:srgbClr val="000000"/>
-                </a:solidFill>
-                <a:effectLst/>
-                <a:latin typeface="Courier New" panose="02070309020205020404" pitchFamily="49" charset="0"/>
-                <a:cs typeface="Courier New" panose="02070309020205020404" pitchFamily="49" charset="0"/>
-              </a:rPr>
-            </a:br>
-            <a:r>
-              <a:rPr kumimoji="0" lang="nl-NL" altLang="nl-NL" sz="1000" b="0" i="0" u="none" strike="noStrike" cap="none" normalizeH="0" baseline="0" dirty="0" smtClean="0">
-                <a:ln>
-                  <a:noFill/>
-                </a:ln>
-                <a:solidFill>
-                  <a:srgbClr val="000000"/>
-                </a:solidFill>
-                <a:effectLst/>
-                <a:latin typeface="Courier New" panose="02070309020205020404" pitchFamily="49" charset="0"/>
-                <a:cs typeface="Courier New" panose="02070309020205020404" pitchFamily="49" charset="0"/>
-              </a:rPr>
-              <a:t>    }</a:t>
-            </a:r>
-            <a:br>
-              <a:rPr kumimoji="0" lang="nl-NL" altLang="nl-NL" sz="1000" b="0" i="0" u="none" strike="noStrike" cap="none" normalizeH="0" baseline="0" dirty="0" smtClean="0">
-                <a:ln>
-                  <a:noFill/>
-                </a:ln>
-                <a:solidFill>
-                  <a:srgbClr val="000000"/>
-                </a:solidFill>
-                <a:effectLst/>
-                <a:latin typeface="Courier New" panose="02070309020205020404" pitchFamily="49" charset="0"/>
-                <a:cs typeface="Courier New" panose="02070309020205020404" pitchFamily="49" charset="0"/>
-              </a:rPr>
-            </a:br>
-            <a:r>
-              <a:rPr kumimoji="0" lang="nl-NL" altLang="nl-NL" sz="1000" b="0" i="0" u="none" strike="noStrike" cap="none" normalizeH="0" baseline="0" dirty="0" smtClean="0">
-                <a:ln>
-                  <a:noFill/>
-                </a:ln>
-                <a:solidFill>
-                  <a:srgbClr val="000000"/>
-                </a:solidFill>
-                <a:effectLst/>
-                <a:latin typeface="Courier New" panose="02070309020205020404" pitchFamily="49" charset="0"/>
-                <a:cs typeface="Courier New" panose="02070309020205020404" pitchFamily="49" charset="0"/>
-              </a:rPr>
-              <a:t>    </a:t>
-            </a:r>
-            <a:r>
-              <a:rPr kumimoji="0" lang="nl-NL" altLang="nl-NL" sz="1000" b="1" i="0" u="none" strike="noStrike" cap="none" normalizeH="0" baseline="0" dirty="0" err="1" smtClean="0">
-                <a:ln>
-                  <a:noFill/>
-                </a:ln>
-                <a:solidFill>
-                  <a:srgbClr val="000080"/>
-                </a:solidFill>
-                <a:effectLst/>
-                <a:latin typeface="Courier New" panose="02070309020205020404" pitchFamily="49" charset="0"/>
-                <a:cs typeface="Courier New" panose="02070309020205020404" pitchFamily="49" charset="0"/>
-              </a:rPr>
-              <a:t>if</a:t>
-            </a:r>
-            <a:r>
-              <a:rPr kumimoji="0" lang="nl-NL" altLang="nl-NL" sz="1000" b="1" i="0" u="none" strike="noStrike" cap="none" normalizeH="0" baseline="0" dirty="0" smtClean="0">
-                <a:ln>
-                  <a:noFill/>
-                </a:ln>
-                <a:solidFill>
-                  <a:srgbClr val="000080"/>
-                </a:solidFill>
-                <a:effectLst/>
-                <a:latin typeface="Courier New" panose="02070309020205020404" pitchFamily="49" charset="0"/>
-                <a:cs typeface="Courier New" panose="02070309020205020404" pitchFamily="49" charset="0"/>
-              </a:rPr>
-              <a:t> </a:t>
-            </a:r>
-            <a:r>
-              <a:rPr kumimoji="0" lang="nl-NL" altLang="nl-NL" sz="1000" b="0" i="0" u="none" strike="noStrike" cap="none" normalizeH="0" baseline="0" dirty="0" smtClean="0">
-                <a:ln>
-                  <a:noFill/>
-                </a:ln>
-                <a:solidFill>
-                  <a:srgbClr val="000000"/>
-                </a:solidFill>
-                <a:effectLst/>
-                <a:latin typeface="Courier New" panose="02070309020205020404" pitchFamily="49" charset="0"/>
-                <a:cs typeface="Courier New" panose="02070309020205020404" pitchFamily="49" charset="0"/>
-              </a:rPr>
-              <a:t>(</a:t>
-            </a:r>
-            <a:r>
-              <a:rPr kumimoji="0" lang="nl-NL" altLang="nl-NL" sz="1000" b="1" i="0" u="none" strike="noStrike" cap="none" normalizeH="0" baseline="0" dirty="0" err="1" smtClean="0">
-                <a:ln>
-                  <a:noFill/>
-                </a:ln>
-                <a:solidFill>
-                  <a:srgbClr val="660E7A"/>
-                </a:solidFill>
-                <a:effectLst/>
-                <a:latin typeface="Courier New" panose="02070309020205020404" pitchFamily="49" charset="0"/>
-                <a:cs typeface="Courier New" panose="02070309020205020404" pitchFamily="49" charset="0"/>
-              </a:rPr>
-              <a:t>rightValue</a:t>
-            </a:r>
-            <a:r>
-              <a:rPr kumimoji="0" lang="nl-NL" altLang="nl-NL" sz="1000" b="1" i="0" u="none" strike="noStrike" cap="none" normalizeH="0" baseline="0" dirty="0" smtClean="0">
-                <a:ln>
-                  <a:noFill/>
-                </a:ln>
-                <a:solidFill>
-                  <a:srgbClr val="660E7A"/>
-                </a:solidFill>
-                <a:effectLst/>
-                <a:latin typeface="Courier New" panose="02070309020205020404" pitchFamily="49" charset="0"/>
-                <a:cs typeface="Courier New" panose="02070309020205020404" pitchFamily="49" charset="0"/>
-              </a:rPr>
-              <a:t> </a:t>
-            </a:r>
-            <a:r>
-              <a:rPr kumimoji="0" lang="nl-NL" altLang="nl-NL" sz="1000" b="0" i="0" u="none" strike="noStrike" cap="none" normalizeH="0" baseline="0" dirty="0" smtClean="0">
-                <a:ln>
-                  <a:noFill/>
-                </a:ln>
-                <a:solidFill>
-                  <a:srgbClr val="000000"/>
-                </a:solidFill>
-                <a:effectLst/>
-                <a:latin typeface="Courier New" panose="02070309020205020404" pitchFamily="49" charset="0"/>
-                <a:cs typeface="Courier New" panose="02070309020205020404" pitchFamily="49" charset="0"/>
-              </a:rPr>
-              <a:t>!= </a:t>
-            </a:r>
-            <a:r>
-              <a:rPr kumimoji="0" lang="nl-NL" altLang="nl-NL" sz="1000" b="1" i="0" u="none" strike="noStrike" cap="none" normalizeH="0" baseline="0" dirty="0" err="1" smtClean="0">
-                <a:ln>
-                  <a:noFill/>
-                </a:ln>
-                <a:solidFill>
-                  <a:srgbClr val="000080"/>
-                </a:solidFill>
-                <a:effectLst/>
-                <a:latin typeface="Courier New" panose="02070309020205020404" pitchFamily="49" charset="0"/>
-                <a:cs typeface="Courier New" panose="02070309020205020404" pitchFamily="49" charset="0"/>
-              </a:rPr>
-              <a:t>null</a:t>
-            </a:r>
-            <a:r>
-              <a:rPr kumimoji="0" lang="nl-NL" altLang="nl-NL" sz="1000" b="0" i="0" u="none" strike="noStrike" cap="none" normalizeH="0" baseline="0" dirty="0" smtClean="0">
-                <a:ln>
-                  <a:noFill/>
-                </a:ln>
-                <a:solidFill>
-                  <a:srgbClr val="000000"/>
-                </a:solidFill>
-                <a:effectLst/>
-                <a:latin typeface="Courier New" panose="02070309020205020404" pitchFamily="49" charset="0"/>
-                <a:cs typeface="Courier New" panose="02070309020205020404" pitchFamily="49" charset="0"/>
-              </a:rPr>
-              <a:t>)</a:t>
-            </a:r>
-            <a:br>
-              <a:rPr kumimoji="0" lang="nl-NL" altLang="nl-NL" sz="1000" b="0" i="0" u="none" strike="noStrike" cap="none" normalizeH="0" baseline="0" dirty="0" smtClean="0">
-                <a:ln>
-                  <a:noFill/>
-                </a:ln>
-                <a:solidFill>
-                  <a:srgbClr val="000000"/>
-                </a:solidFill>
-                <a:effectLst/>
-                <a:latin typeface="Courier New" panose="02070309020205020404" pitchFamily="49" charset="0"/>
-                <a:cs typeface="Courier New" panose="02070309020205020404" pitchFamily="49" charset="0"/>
-              </a:rPr>
-            </a:br>
-            <a:r>
-              <a:rPr kumimoji="0" lang="nl-NL" altLang="nl-NL" sz="1000" b="0" i="0" u="none" strike="noStrike" cap="none" normalizeH="0" baseline="0" dirty="0" smtClean="0">
-                <a:ln>
-                  <a:noFill/>
-                </a:ln>
-                <a:solidFill>
-                  <a:srgbClr val="000000"/>
-                </a:solidFill>
-                <a:effectLst/>
-                <a:latin typeface="Courier New" panose="02070309020205020404" pitchFamily="49" charset="0"/>
-                <a:cs typeface="Courier New" panose="02070309020205020404" pitchFamily="49" charset="0"/>
-              </a:rPr>
-              <a:t>    {</a:t>
-            </a:r>
-            <a:br>
-              <a:rPr kumimoji="0" lang="nl-NL" altLang="nl-NL" sz="1000" b="0" i="0" u="none" strike="noStrike" cap="none" normalizeH="0" baseline="0" dirty="0" smtClean="0">
-                <a:ln>
-                  <a:noFill/>
-                </a:ln>
-                <a:solidFill>
-                  <a:srgbClr val="000000"/>
-                </a:solidFill>
-                <a:effectLst/>
-                <a:latin typeface="Courier New" panose="02070309020205020404" pitchFamily="49" charset="0"/>
-                <a:cs typeface="Courier New" panose="02070309020205020404" pitchFamily="49" charset="0"/>
-              </a:rPr>
-            </a:br>
-            <a:r>
-              <a:rPr kumimoji="0" lang="nl-NL" altLang="nl-NL" sz="1000" b="0" i="0" u="none" strike="noStrike" cap="none" normalizeH="0" baseline="0" dirty="0" smtClean="0">
-                <a:ln>
-                  <a:noFill/>
-                </a:ln>
-                <a:solidFill>
-                  <a:srgbClr val="000000"/>
-                </a:solidFill>
-                <a:effectLst/>
-                <a:latin typeface="Courier New" panose="02070309020205020404" pitchFamily="49" charset="0"/>
-                <a:cs typeface="Courier New" panose="02070309020205020404" pitchFamily="49" charset="0"/>
-              </a:rPr>
-              <a:t>        </a:t>
-            </a:r>
-            <a:r>
-              <a:rPr kumimoji="0" lang="nl-NL" altLang="nl-NL" sz="1000" b="0" i="0" u="none" strike="noStrike" cap="none" normalizeH="0" baseline="0" dirty="0" err="1" smtClean="0">
-                <a:ln>
-                  <a:noFill/>
-                </a:ln>
-                <a:solidFill>
-                  <a:srgbClr val="000000"/>
-                </a:solidFill>
-                <a:effectLst/>
-                <a:latin typeface="Courier New" panose="02070309020205020404" pitchFamily="49" charset="0"/>
-                <a:cs typeface="Courier New" panose="02070309020205020404" pitchFamily="49" charset="0"/>
-              </a:rPr>
-              <a:t>rightSize</a:t>
-            </a:r>
-            <a:r>
-              <a:rPr kumimoji="0" lang="nl-NL" altLang="nl-NL" sz="1000" b="0" i="0" u="none" strike="noStrike" cap="none" normalizeH="0" baseline="0" dirty="0" smtClean="0">
-                <a:ln>
-                  <a:noFill/>
-                </a:ln>
-                <a:solidFill>
-                  <a:srgbClr val="000000"/>
-                </a:solidFill>
-                <a:effectLst/>
-                <a:latin typeface="Courier New" panose="02070309020205020404" pitchFamily="49" charset="0"/>
-                <a:cs typeface="Courier New" panose="02070309020205020404" pitchFamily="49" charset="0"/>
-              </a:rPr>
-              <a:t> = </a:t>
-            </a:r>
-            <a:r>
-              <a:rPr kumimoji="0" lang="nl-NL" altLang="nl-NL" sz="1000" b="1" i="0" u="none" strike="noStrike" cap="none" normalizeH="0" baseline="0" dirty="0" err="1" smtClean="0">
-                <a:ln>
-                  <a:noFill/>
-                </a:ln>
-                <a:solidFill>
-                  <a:srgbClr val="660E7A"/>
-                </a:solidFill>
-                <a:effectLst/>
-                <a:latin typeface="Courier New" panose="02070309020205020404" pitchFamily="49" charset="0"/>
-                <a:cs typeface="Courier New" panose="02070309020205020404" pitchFamily="49" charset="0"/>
-              </a:rPr>
-              <a:t>rightValue</a:t>
-            </a:r>
-            <a:r>
-              <a:rPr kumimoji="0" lang="nl-NL" altLang="nl-NL" sz="1000" b="0" i="0" u="none" strike="noStrike" cap="none" normalizeH="0" baseline="0" dirty="0" err="1" smtClean="0">
-                <a:ln>
-                  <a:noFill/>
-                </a:ln>
-                <a:solidFill>
-                  <a:srgbClr val="000000"/>
-                </a:solidFill>
-                <a:effectLst/>
-                <a:latin typeface="Courier New" panose="02070309020205020404" pitchFamily="49" charset="0"/>
-                <a:cs typeface="Courier New" panose="02070309020205020404" pitchFamily="49" charset="0"/>
-              </a:rPr>
-              <a:t>.size</a:t>
-            </a:r>
-            <a:r>
-              <a:rPr kumimoji="0" lang="nl-NL" altLang="nl-NL" sz="1000" b="0" i="0" u="none" strike="noStrike" cap="none" normalizeH="0" baseline="0" dirty="0" smtClean="0">
-                <a:ln>
-                  <a:noFill/>
-                </a:ln>
-                <a:solidFill>
-                  <a:srgbClr val="000000"/>
-                </a:solidFill>
-                <a:effectLst/>
-                <a:latin typeface="Courier New" panose="02070309020205020404" pitchFamily="49" charset="0"/>
-                <a:cs typeface="Courier New" panose="02070309020205020404" pitchFamily="49" charset="0"/>
-              </a:rPr>
-              <a:t>();</a:t>
-            </a:r>
-            <a:br>
-              <a:rPr kumimoji="0" lang="nl-NL" altLang="nl-NL" sz="1000" b="0" i="0" u="none" strike="noStrike" cap="none" normalizeH="0" baseline="0" dirty="0" smtClean="0">
-                <a:ln>
-                  <a:noFill/>
-                </a:ln>
-                <a:solidFill>
-                  <a:srgbClr val="000000"/>
-                </a:solidFill>
-                <a:effectLst/>
-                <a:latin typeface="Courier New" panose="02070309020205020404" pitchFamily="49" charset="0"/>
-                <a:cs typeface="Courier New" panose="02070309020205020404" pitchFamily="49" charset="0"/>
-              </a:rPr>
-            </a:br>
-            <a:r>
-              <a:rPr kumimoji="0" lang="nl-NL" altLang="nl-NL" sz="1000" b="0" i="0" u="none" strike="noStrike" cap="none" normalizeH="0" baseline="0" dirty="0" smtClean="0">
-                <a:ln>
-                  <a:noFill/>
-                </a:ln>
-                <a:solidFill>
-                  <a:srgbClr val="000000"/>
-                </a:solidFill>
-                <a:effectLst/>
-                <a:latin typeface="Courier New" panose="02070309020205020404" pitchFamily="49" charset="0"/>
-                <a:cs typeface="Courier New" panose="02070309020205020404" pitchFamily="49" charset="0"/>
-              </a:rPr>
-              <a:t>    }</a:t>
-            </a:r>
-            <a:br>
-              <a:rPr kumimoji="0" lang="nl-NL" altLang="nl-NL" sz="1000" b="0" i="0" u="none" strike="noStrike" cap="none" normalizeH="0" baseline="0" dirty="0" smtClean="0">
-                <a:ln>
-                  <a:noFill/>
-                </a:ln>
-                <a:solidFill>
-                  <a:srgbClr val="000000"/>
-                </a:solidFill>
-                <a:effectLst/>
-                <a:latin typeface="Courier New" panose="02070309020205020404" pitchFamily="49" charset="0"/>
-                <a:cs typeface="Courier New" panose="02070309020205020404" pitchFamily="49" charset="0"/>
-              </a:rPr>
-            </a:br>
-            <a:r>
-              <a:rPr kumimoji="0" lang="nl-NL" altLang="nl-NL" sz="1000" b="0" i="0" u="none" strike="noStrike" cap="none" normalizeH="0" baseline="0" dirty="0" smtClean="0">
-                <a:ln>
-                  <a:noFill/>
-                </a:ln>
-                <a:solidFill>
-                  <a:srgbClr val="000000"/>
-                </a:solidFill>
-                <a:effectLst/>
-                <a:latin typeface="Courier New" panose="02070309020205020404" pitchFamily="49" charset="0"/>
-                <a:cs typeface="Courier New" panose="02070309020205020404" pitchFamily="49" charset="0"/>
-              </a:rPr>
-              <a:t>    </a:t>
-            </a:r>
-            <a:r>
-              <a:rPr kumimoji="0" lang="nl-NL" altLang="nl-NL" sz="1000" b="1" i="0" u="none" strike="noStrike" cap="none" normalizeH="0" baseline="0" dirty="0" smtClean="0">
-                <a:ln>
-                  <a:noFill/>
-                </a:ln>
-                <a:solidFill>
-                  <a:srgbClr val="000080"/>
-                </a:solidFill>
-                <a:effectLst/>
-                <a:latin typeface="Courier New" panose="02070309020205020404" pitchFamily="49" charset="0"/>
-                <a:cs typeface="Courier New" panose="02070309020205020404" pitchFamily="49" charset="0"/>
-              </a:rPr>
-              <a:t>return </a:t>
-            </a:r>
-            <a:r>
-              <a:rPr kumimoji="0" lang="nl-NL" altLang="nl-NL" sz="1000" b="0" i="0" u="none" strike="noStrike" cap="none" normalizeH="0" baseline="0" dirty="0" err="1" smtClean="0">
-                <a:ln>
-                  <a:noFill/>
-                </a:ln>
-                <a:solidFill>
-                  <a:srgbClr val="000000"/>
-                </a:solidFill>
-                <a:effectLst/>
-                <a:latin typeface="Courier New" panose="02070309020205020404" pitchFamily="49" charset="0"/>
-                <a:cs typeface="Courier New" panose="02070309020205020404" pitchFamily="49" charset="0"/>
-              </a:rPr>
-              <a:t>leftSize</a:t>
-            </a:r>
-            <a:r>
-              <a:rPr kumimoji="0" lang="nl-NL" altLang="nl-NL" sz="1000" b="0" i="0" u="none" strike="noStrike" cap="none" normalizeH="0" baseline="0" dirty="0" smtClean="0">
-                <a:ln>
-                  <a:noFill/>
-                </a:ln>
-                <a:solidFill>
-                  <a:srgbClr val="000000"/>
-                </a:solidFill>
-                <a:effectLst/>
-                <a:latin typeface="Courier New" panose="02070309020205020404" pitchFamily="49" charset="0"/>
-                <a:cs typeface="Courier New" panose="02070309020205020404" pitchFamily="49" charset="0"/>
-              </a:rPr>
-              <a:t> - </a:t>
-            </a:r>
-            <a:r>
-              <a:rPr kumimoji="0" lang="nl-NL" altLang="nl-NL" sz="1000" b="0" i="0" u="none" strike="noStrike" cap="none" normalizeH="0" baseline="0" dirty="0" err="1" smtClean="0">
-                <a:ln>
-                  <a:noFill/>
-                </a:ln>
-                <a:solidFill>
-                  <a:srgbClr val="000000"/>
-                </a:solidFill>
-                <a:effectLst/>
-                <a:latin typeface="Courier New" panose="02070309020205020404" pitchFamily="49" charset="0"/>
-                <a:cs typeface="Courier New" panose="02070309020205020404" pitchFamily="49" charset="0"/>
-              </a:rPr>
-              <a:t>rightSize</a:t>
-            </a:r>
-            <a:r>
-              <a:rPr kumimoji="0" lang="nl-NL" altLang="nl-NL" sz="1000" b="0" i="0" u="none" strike="noStrike" cap="none" normalizeH="0" baseline="0" dirty="0" smtClean="0">
-                <a:ln>
-                  <a:noFill/>
-                </a:ln>
-                <a:solidFill>
-                  <a:srgbClr val="000000"/>
-                </a:solidFill>
-                <a:effectLst/>
-                <a:latin typeface="Courier New" panose="02070309020205020404" pitchFamily="49" charset="0"/>
-                <a:cs typeface="Courier New" panose="02070309020205020404" pitchFamily="49" charset="0"/>
-              </a:rPr>
-              <a:t>;</a:t>
-            </a:r>
-            <a:br>
-              <a:rPr kumimoji="0" lang="nl-NL" altLang="nl-NL" sz="1000" b="0" i="0" u="none" strike="noStrike" cap="none" normalizeH="0" baseline="0" dirty="0" smtClean="0">
-                <a:ln>
-                  <a:noFill/>
-                </a:ln>
-                <a:solidFill>
-                  <a:srgbClr val="000000"/>
-                </a:solidFill>
-                <a:effectLst/>
-                <a:latin typeface="Courier New" panose="02070309020205020404" pitchFamily="49" charset="0"/>
-                <a:cs typeface="Courier New" panose="02070309020205020404" pitchFamily="49" charset="0"/>
-              </a:rPr>
-            </a:br>
-            <a:r>
-              <a:rPr kumimoji="0" lang="nl-NL" altLang="nl-NL" sz="1000" b="0" i="0" u="none" strike="noStrike" cap="none" normalizeH="0" baseline="0" dirty="0" smtClean="0">
-                <a:ln>
-                  <a:noFill/>
-                </a:ln>
-                <a:solidFill>
-                  <a:srgbClr val="000000"/>
-                </a:solidFill>
-                <a:effectLst/>
-                <a:latin typeface="Courier New" panose="02070309020205020404" pitchFamily="49" charset="0"/>
-                <a:cs typeface="Courier New" panose="02070309020205020404" pitchFamily="49" charset="0"/>
-              </a:rPr>
-              <a:t>}</a:t>
-            </a:r>
-            <a:endParaRPr kumimoji="0" lang="nl-NL" altLang="nl-NL" sz="1800" b="0" i="0" u="none" strike="noStrike" cap="none" normalizeH="0" baseline="0" dirty="0" smtClean="0">
-              <a:ln>
-                <a:noFill/>
-              </a:ln>
-              <a:solidFill>
-                <a:schemeClr val="tx1"/>
-              </a:solidFill>
-              <a:effectLst/>
-              <a:latin typeface="Arial" panose="020B0604020202020204" pitchFamily="34" charset="0"/>
-            </a:endParaRPr>
-          </a:p>
-        </p:txBody>
-      </p:sp>
-      <p:sp>
-        <p:nvSpPr>
-          <p:cNvPr id="5" name="Rectangle 2"/>
-          <p:cNvSpPr>
-            <a:spLocks noChangeArrowheads="1"/>
-          </p:cNvSpPr>
-          <p:nvPr/>
-        </p:nvSpPr>
-        <p:spPr bwMode="auto">
-          <a:xfrm>
-            <a:off x="4283968" y="4941168"/>
-            <a:ext cx="9144000" cy="457200"/>
-          </a:xfrm>
-          <a:prstGeom prst="rect">
-            <a:avLst/>
-          </a:prstGeom>
-          <a:noFill/>
-          <a:ln>
-            <a:noFill/>
-          </a:ln>
-          <a:effectLst/>
-        </p:spPr>
-        <p:txBody>
-          <a:bodyPr vert="horz" wrap="none" lIns="91440" tIns="45720" rIns="91440" bIns="45720" numCol="1" anchor="ctr" anchorCtr="0" compatLnSpc="1">
-            <a:prstTxWarp prst="textNoShape">
-              <a:avLst/>
-            </a:prstTxWarp>
-            <a:spAutoFit/>
-          </a:bodyPr>
-          <a:lstStyle/>
-          <a:p>
-            <a:pPr marL="0" marR="0" lvl="0" indent="0" algn="l" defTabSz="914400" rtl="0" eaLnBrk="0" fontAlgn="base" latinLnBrk="0" hangingPunct="0">
-              <a:lnSpc>
-                <a:spcPct val="100000"/>
-              </a:lnSpc>
-              <a:spcBef>
-                <a:spcPct val="0"/>
-              </a:spcBef>
-              <a:spcAft>
-                <a:spcPct val="0"/>
-              </a:spcAft>
-              <a:buClrTx/>
-              <a:buSzTx/>
-              <a:buFontTx/>
-              <a:buNone/>
-              <a:tabLst/>
-            </a:pPr>
-            <a:r>
-              <a:rPr kumimoji="0" lang="nl-NL" altLang="nl-NL" sz="1000" b="1" i="0" u="none" strike="noStrike" cap="none" normalizeH="0" baseline="0" smtClean="0">
-                <a:ln>
-                  <a:noFill/>
-                </a:ln>
-                <a:solidFill>
-                  <a:srgbClr val="000080"/>
-                </a:solidFill>
-                <a:effectLst/>
-                <a:latin typeface="Courier New" panose="02070309020205020404" pitchFamily="49" charset="0"/>
-                <a:cs typeface="Courier New" panose="02070309020205020404" pitchFamily="49" charset="0"/>
-              </a:rPr>
-              <a:t>public void </a:t>
-            </a:r>
-            <a:r>
-              <a:rPr kumimoji="0" lang="nl-NL" altLang="nl-NL" sz="1000" b="0" i="0" u="none" strike="noStrike" cap="none" normalizeH="0" baseline="0" smtClean="0">
-                <a:ln>
-                  <a:noFill/>
-                </a:ln>
-                <a:solidFill>
-                  <a:srgbClr val="000000"/>
-                </a:solidFill>
-                <a:effectLst/>
-                <a:latin typeface="Courier New" panose="02070309020205020404" pitchFamily="49" charset="0"/>
-                <a:cs typeface="Courier New" panose="02070309020205020404" pitchFamily="49" charset="0"/>
-              </a:rPr>
-              <a:t>rebalance()</a:t>
-            </a:r>
-            <a:br>
-              <a:rPr kumimoji="0" lang="nl-NL" altLang="nl-NL" sz="1000" b="0" i="0" u="none" strike="noStrike" cap="none" normalizeH="0" baseline="0" smtClean="0">
-                <a:ln>
-                  <a:noFill/>
-                </a:ln>
-                <a:solidFill>
-                  <a:srgbClr val="000000"/>
-                </a:solidFill>
-                <a:effectLst/>
-                <a:latin typeface="Courier New" panose="02070309020205020404" pitchFamily="49" charset="0"/>
-                <a:cs typeface="Courier New" panose="02070309020205020404" pitchFamily="49" charset="0"/>
-              </a:rPr>
-            </a:br>
-            <a:r>
-              <a:rPr kumimoji="0" lang="nl-NL" altLang="nl-NL" sz="1000" b="0" i="0" u="none" strike="noStrike" cap="none" normalizeH="0" baseline="0" smtClean="0">
-                <a:ln>
-                  <a:noFill/>
-                </a:ln>
-                <a:solidFill>
-                  <a:srgbClr val="000000"/>
-                </a:solidFill>
-                <a:effectLst/>
-                <a:latin typeface="Courier New" panose="02070309020205020404" pitchFamily="49" charset="0"/>
-                <a:cs typeface="Courier New" panose="02070309020205020404" pitchFamily="49" charset="0"/>
-              </a:rPr>
-              <a:t>{</a:t>
-            </a:r>
-            <a:br>
-              <a:rPr kumimoji="0" lang="nl-NL" altLang="nl-NL" sz="1000" b="0" i="0" u="none" strike="noStrike" cap="none" normalizeH="0" baseline="0" smtClean="0">
-                <a:ln>
-                  <a:noFill/>
-                </a:ln>
-                <a:solidFill>
-                  <a:srgbClr val="000000"/>
-                </a:solidFill>
-                <a:effectLst/>
-                <a:latin typeface="Courier New" panose="02070309020205020404" pitchFamily="49" charset="0"/>
-                <a:cs typeface="Courier New" panose="02070309020205020404" pitchFamily="49" charset="0"/>
-              </a:rPr>
-            </a:br>
-            <a:r>
-              <a:rPr kumimoji="0" lang="nl-NL" altLang="nl-NL" sz="1000" b="0" i="0" u="none" strike="noStrike" cap="none" normalizeH="0" baseline="0" smtClean="0">
-                <a:ln>
-                  <a:noFill/>
-                </a:ln>
-                <a:solidFill>
-                  <a:srgbClr val="000000"/>
-                </a:solidFill>
-                <a:effectLst/>
-                <a:latin typeface="Courier New" panose="02070309020205020404" pitchFamily="49" charset="0"/>
-                <a:cs typeface="Courier New" panose="02070309020205020404" pitchFamily="49" charset="0"/>
-              </a:rPr>
-              <a:t>    AVLNode&lt;</a:t>
-            </a:r>
-            <a:r>
-              <a:rPr kumimoji="0" lang="nl-NL" altLang="nl-NL" sz="1000" b="0" i="0" u="none" strike="noStrike" cap="none" normalizeH="0" baseline="0" smtClean="0">
-                <a:ln>
-                  <a:noFill/>
-                </a:ln>
-                <a:solidFill>
-                  <a:srgbClr val="20999D"/>
-                </a:solidFill>
-                <a:effectLst/>
-                <a:latin typeface="Courier New" panose="02070309020205020404" pitchFamily="49" charset="0"/>
-                <a:cs typeface="Courier New" panose="02070309020205020404" pitchFamily="49" charset="0"/>
-              </a:rPr>
-              <a:t>K</a:t>
-            </a:r>
-            <a:r>
-              <a:rPr kumimoji="0" lang="nl-NL" altLang="nl-NL" sz="1000" b="0" i="0" u="none" strike="noStrike" cap="none" normalizeH="0" baseline="0" smtClean="0">
-                <a:ln>
-                  <a:noFill/>
-                </a:ln>
-                <a:solidFill>
-                  <a:srgbClr val="000000"/>
-                </a:solidFill>
-                <a:effectLst/>
-                <a:latin typeface="Courier New" panose="02070309020205020404" pitchFamily="49" charset="0"/>
-                <a:cs typeface="Courier New" panose="02070309020205020404" pitchFamily="49" charset="0"/>
-              </a:rPr>
-              <a:t>, </a:t>
-            </a:r>
-            <a:r>
-              <a:rPr kumimoji="0" lang="nl-NL" altLang="nl-NL" sz="1000" b="0" i="0" u="none" strike="noStrike" cap="none" normalizeH="0" baseline="0" smtClean="0">
-                <a:ln>
-                  <a:noFill/>
-                </a:ln>
-                <a:solidFill>
-                  <a:srgbClr val="20999D"/>
-                </a:solidFill>
-                <a:effectLst/>
-                <a:latin typeface="Courier New" panose="02070309020205020404" pitchFamily="49" charset="0"/>
-                <a:cs typeface="Courier New" panose="02070309020205020404" pitchFamily="49" charset="0"/>
-              </a:rPr>
-              <a:t>V</a:t>
-            </a:r>
-            <a:r>
-              <a:rPr kumimoji="0" lang="nl-NL" altLang="nl-NL" sz="1000" b="0" i="0" u="none" strike="noStrike" cap="none" normalizeH="0" baseline="0" smtClean="0">
-                <a:ln>
-                  <a:noFill/>
-                </a:ln>
-                <a:solidFill>
-                  <a:srgbClr val="000000"/>
-                </a:solidFill>
-                <a:effectLst/>
-                <a:latin typeface="Courier New" panose="02070309020205020404" pitchFamily="49" charset="0"/>
-                <a:cs typeface="Courier New" panose="02070309020205020404" pitchFamily="49" charset="0"/>
-              </a:rPr>
-              <a:t>&gt; current = </a:t>
-            </a:r>
-            <a:r>
-              <a:rPr kumimoji="0" lang="nl-NL" altLang="nl-NL" sz="1000" b="1" i="0" u="none" strike="noStrike" cap="none" normalizeH="0" baseline="0" smtClean="0">
-                <a:ln>
-                  <a:noFill/>
-                </a:ln>
-                <a:solidFill>
-                  <a:srgbClr val="000080"/>
-                </a:solidFill>
-                <a:effectLst/>
-                <a:latin typeface="Courier New" panose="02070309020205020404" pitchFamily="49" charset="0"/>
-                <a:cs typeface="Courier New" panose="02070309020205020404" pitchFamily="49" charset="0"/>
-              </a:rPr>
-              <a:t>this</a:t>
-            </a:r>
-            <a:r>
-              <a:rPr kumimoji="0" lang="nl-NL" altLang="nl-NL" sz="1000" b="0" i="0" u="none" strike="noStrike" cap="none" normalizeH="0" baseline="0" smtClean="0">
-                <a:ln>
-                  <a:noFill/>
-                </a:ln>
-                <a:solidFill>
-                  <a:srgbClr val="000000"/>
-                </a:solidFill>
-                <a:effectLst/>
-                <a:latin typeface="Courier New" panose="02070309020205020404" pitchFamily="49" charset="0"/>
-                <a:cs typeface="Courier New" panose="02070309020205020404" pitchFamily="49" charset="0"/>
-              </a:rPr>
-              <a:t>;</a:t>
-            </a:r>
-            <a:br>
-              <a:rPr kumimoji="0" lang="nl-NL" altLang="nl-NL" sz="1000" b="0" i="0" u="none" strike="noStrike" cap="none" normalizeH="0" baseline="0" smtClean="0">
-                <a:ln>
-                  <a:noFill/>
-                </a:ln>
-                <a:solidFill>
-                  <a:srgbClr val="000000"/>
-                </a:solidFill>
-                <a:effectLst/>
-                <a:latin typeface="Courier New" panose="02070309020205020404" pitchFamily="49" charset="0"/>
-                <a:cs typeface="Courier New" panose="02070309020205020404" pitchFamily="49" charset="0"/>
-              </a:rPr>
-            </a:br>
-            <a:r>
-              <a:rPr kumimoji="0" lang="nl-NL" altLang="nl-NL" sz="1000" b="0" i="0" u="none" strike="noStrike" cap="none" normalizeH="0" baseline="0" smtClean="0">
-                <a:ln>
-                  <a:noFill/>
-                </a:ln>
-                <a:solidFill>
-                  <a:srgbClr val="000000"/>
-                </a:solidFill>
-                <a:effectLst/>
-                <a:latin typeface="Courier New" panose="02070309020205020404" pitchFamily="49" charset="0"/>
-                <a:cs typeface="Courier New" panose="02070309020205020404" pitchFamily="49" charset="0"/>
-              </a:rPr>
-              <a:t>    </a:t>
-            </a:r>
-            <a:r>
-              <a:rPr kumimoji="0" lang="nl-NL" altLang="nl-NL" sz="1000" b="1" i="0" u="none" strike="noStrike" cap="none" normalizeH="0" baseline="0" smtClean="0">
-                <a:ln>
-                  <a:noFill/>
-                </a:ln>
-                <a:solidFill>
-                  <a:srgbClr val="000080"/>
-                </a:solidFill>
-                <a:effectLst/>
-                <a:latin typeface="Courier New" panose="02070309020205020404" pitchFamily="49" charset="0"/>
-                <a:cs typeface="Courier New" panose="02070309020205020404" pitchFamily="49" charset="0"/>
-              </a:rPr>
-              <a:t>while </a:t>
-            </a:r>
-            <a:r>
-              <a:rPr kumimoji="0" lang="nl-NL" altLang="nl-NL" sz="1000" b="0" i="0" u="none" strike="noStrike" cap="none" normalizeH="0" baseline="0" smtClean="0">
-                <a:ln>
-                  <a:noFill/>
-                </a:ln>
-                <a:solidFill>
-                  <a:srgbClr val="000000"/>
-                </a:solidFill>
-                <a:effectLst/>
-                <a:latin typeface="Courier New" panose="02070309020205020404" pitchFamily="49" charset="0"/>
-                <a:cs typeface="Courier New" panose="02070309020205020404" pitchFamily="49" charset="0"/>
-              </a:rPr>
-              <a:t>(current != </a:t>
-            </a:r>
-            <a:r>
-              <a:rPr kumimoji="0" lang="nl-NL" altLang="nl-NL" sz="1000" b="1" i="0" u="none" strike="noStrike" cap="none" normalizeH="0" baseline="0" smtClean="0">
-                <a:ln>
-                  <a:noFill/>
-                </a:ln>
-                <a:solidFill>
-                  <a:srgbClr val="000080"/>
-                </a:solidFill>
-                <a:effectLst/>
-                <a:latin typeface="Courier New" panose="02070309020205020404" pitchFamily="49" charset="0"/>
-                <a:cs typeface="Courier New" panose="02070309020205020404" pitchFamily="49" charset="0"/>
-              </a:rPr>
-              <a:t>null</a:t>
-            </a:r>
-            <a:r>
-              <a:rPr kumimoji="0" lang="nl-NL" altLang="nl-NL" sz="1000" b="0" i="0" u="none" strike="noStrike" cap="none" normalizeH="0" baseline="0" smtClean="0">
-                <a:ln>
-                  <a:noFill/>
-                </a:ln>
-                <a:solidFill>
-                  <a:srgbClr val="000000"/>
-                </a:solidFill>
-                <a:effectLst/>
-                <a:latin typeface="Courier New" panose="02070309020205020404" pitchFamily="49" charset="0"/>
-                <a:cs typeface="Courier New" panose="02070309020205020404" pitchFamily="49" charset="0"/>
-              </a:rPr>
-              <a:t>)</a:t>
-            </a:r>
-            <a:br>
-              <a:rPr kumimoji="0" lang="nl-NL" altLang="nl-NL" sz="1000" b="0" i="0" u="none" strike="noStrike" cap="none" normalizeH="0" baseline="0" smtClean="0">
-                <a:ln>
-                  <a:noFill/>
-                </a:ln>
-                <a:solidFill>
-                  <a:srgbClr val="000000"/>
-                </a:solidFill>
-                <a:effectLst/>
-                <a:latin typeface="Courier New" panose="02070309020205020404" pitchFamily="49" charset="0"/>
-                <a:cs typeface="Courier New" panose="02070309020205020404" pitchFamily="49" charset="0"/>
-              </a:rPr>
-            </a:br>
-            <a:r>
-              <a:rPr kumimoji="0" lang="nl-NL" altLang="nl-NL" sz="1000" b="0" i="0" u="none" strike="noStrike" cap="none" normalizeH="0" baseline="0" smtClean="0">
-                <a:ln>
-                  <a:noFill/>
-                </a:ln>
-                <a:solidFill>
-                  <a:srgbClr val="000000"/>
-                </a:solidFill>
-                <a:effectLst/>
-                <a:latin typeface="Courier New" panose="02070309020205020404" pitchFamily="49" charset="0"/>
-                <a:cs typeface="Courier New" panose="02070309020205020404" pitchFamily="49" charset="0"/>
-              </a:rPr>
-              <a:t>    {</a:t>
-            </a:r>
-            <a:br>
-              <a:rPr kumimoji="0" lang="nl-NL" altLang="nl-NL" sz="1000" b="0" i="0" u="none" strike="noStrike" cap="none" normalizeH="0" baseline="0" smtClean="0">
-                <a:ln>
-                  <a:noFill/>
-                </a:ln>
-                <a:solidFill>
-                  <a:srgbClr val="000000"/>
-                </a:solidFill>
-                <a:effectLst/>
-                <a:latin typeface="Courier New" panose="02070309020205020404" pitchFamily="49" charset="0"/>
-                <a:cs typeface="Courier New" panose="02070309020205020404" pitchFamily="49" charset="0"/>
-              </a:rPr>
-            </a:br>
-            <a:r>
-              <a:rPr kumimoji="0" lang="nl-NL" altLang="nl-NL" sz="1000" b="0" i="0" u="none" strike="noStrike" cap="none" normalizeH="0" baseline="0" smtClean="0">
-                <a:ln>
-                  <a:noFill/>
-                </a:ln>
-                <a:solidFill>
-                  <a:srgbClr val="000000"/>
-                </a:solidFill>
-                <a:effectLst/>
-                <a:latin typeface="Courier New" panose="02070309020205020404" pitchFamily="49" charset="0"/>
-                <a:cs typeface="Courier New" panose="02070309020205020404" pitchFamily="49" charset="0"/>
-              </a:rPr>
-              <a:t>        </a:t>
-            </a:r>
-            <a:r>
-              <a:rPr kumimoji="0" lang="nl-NL" altLang="nl-NL" sz="1000" b="1" i="0" u="none" strike="noStrike" cap="none" normalizeH="0" baseline="0" smtClean="0">
-                <a:ln>
-                  <a:noFill/>
-                </a:ln>
-                <a:solidFill>
-                  <a:srgbClr val="000080"/>
-                </a:solidFill>
-                <a:effectLst/>
-                <a:latin typeface="Courier New" panose="02070309020205020404" pitchFamily="49" charset="0"/>
-                <a:cs typeface="Courier New" panose="02070309020205020404" pitchFamily="49" charset="0"/>
-              </a:rPr>
-              <a:t>int </a:t>
-            </a:r>
-            <a:r>
-              <a:rPr kumimoji="0" lang="nl-NL" altLang="nl-NL" sz="1000" b="0" i="0" u="none" strike="noStrike" cap="none" normalizeH="0" baseline="0" smtClean="0">
-                <a:ln>
-                  <a:noFill/>
-                </a:ln>
-                <a:solidFill>
-                  <a:srgbClr val="000000"/>
-                </a:solidFill>
-                <a:effectLst/>
-                <a:latin typeface="Courier New" panose="02070309020205020404" pitchFamily="49" charset="0"/>
-                <a:cs typeface="Courier New" panose="02070309020205020404" pitchFamily="49" charset="0"/>
-              </a:rPr>
-              <a:t>balanceFactor = current.balanceFactor();</a:t>
-            </a:r>
-            <a:br>
-              <a:rPr kumimoji="0" lang="nl-NL" altLang="nl-NL" sz="1000" b="0" i="0" u="none" strike="noStrike" cap="none" normalizeH="0" baseline="0" smtClean="0">
-                <a:ln>
-                  <a:noFill/>
-                </a:ln>
-                <a:solidFill>
-                  <a:srgbClr val="000000"/>
-                </a:solidFill>
-                <a:effectLst/>
-                <a:latin typeface="Courier New" panose="02070309020205020404" pitchFamily="49" charset="0"/>
-                <a:cs typeface="Courier New" panose="02070309020205020404" pitchFamily="49" charset="0"/>
-              </a:rPr>
-            </a:br>
-            <a:r>
-              <a:rPr kumimoji="0" lang="nl-NL" altLang="nl-NL" sz="1000" b="0" i="0" u="none" strike="noStrike" cap="none" normalizeH="0" baseline="0" smtClean="0">
-                <a:ln>
-                  <a:noFill/>
-                </a:ln>
-                <a:solidFill>
-                  <a:srgbClr val="000000"/>
-                </a:solidFill>
-                <a:effectLst/>
-                <a:latin typeface="Courier New" panose="02070309020205020404" pitchFamily="49" charset="0"/>
-                <a:cs typeface="Courier New" panose="02070309020205020404" pitchFamily="49" charset="0"/>
-              </a:rPr>
-              <a:t>        </a:t>
-            </a:r>
-            <a:r>
-              <a:rPr kumimoji="0" lang="nl-NL" altLang="nl-NL" sz="1000" b="1" i="0" u="none" strike="noStrike" cap="none" normalizeH="0" baseline="0" smtClean="0">
-                <a:ln>
-                  <a:noFill/>
-                </a:ln>
-                <a:solidFill>
-                  <a:srgbClr val="000080"/>
-                </a:solidFill>
-                <a:effectLst/>
-                <a:latin typeface="Courier New" panose="02070309020205020404" pitchFamily="49" charset="0"/>
-                <a:cs typeface="Courier New" panose="02070309020205020404" pitchFamily="49" charset="0"/>
-              </a:rPr>
-              <a:t>if </a:t>
-            </a:r>
-            <a:r>
-              <a:rPr kumimoji="0" lang="nl-NL" altLang="nl-NL" sz="1000" b="0" i="0" u="none" strike="noStrike" cap="none" normalizeH="0" baseline="0" smtClean="0">
-                <a:ln>
-                  <a:noFill/>
-                </a:ln>
-                <a:solidFill>
-                  <a:srgbClr val="000000"/>
-                </a:solidFill>
-                <a:effectLst/>
-                <a:latin typeface="Courier New" panose="02070309020205020404" pitchFamily="49" charset="0"/>
-                <a:cs typeface="Courier New" panose="02070309020205020404" pitchFamily="49" charset="0"/>
-              </a:rPr>
-              <a:t>(balanceFactor &gt; </a:t>
-            </a:r>
-            <a:r>
-              <a:rPr kumimoji="0" lang="nl-NL" altLang="nl-NL" sz="1000" b="0" i="0" u="none" strike="noStrike" cap="none" normalizeH="0" baseline="0" smtClean="0">
-                <a:ln>
-                  <a:noFill/>
-                </a:ln>
-                <a:solidFill>
-                  <a:srgbClr val="0000FF"/>
-                </a:solidFill>
-                <a:effectLst/>
-                <a:latin typeface="Courier New" panose="02070309020205020404" pitchFamily="49" charset="0"/>
-                <a:cs typeface="Courier New" panose="02070309020205020404" pitchFamily="49" charset="0"/>
-              </a:rPr>
-              <a:t>1</a:t>
-            </a:r>
-            <a:r>
-              <a:rPr kumimoji="0" lang="nl-NL" altLang="nl-NL" sz="1000" b="0" i="0" u="none" strike="noStrike" cap="none" normalizeH="0" baseline="0" smtClean="0">
-                <a:ln>
-                  <a:noFill/>
-                </a:ln>
-                <a:solidFill>
-                  <a:srgbClr val="000000"/>
-                </a:solidFill>
-                <a:effectLst/>
-                <a:latin typeface="Courier New" panose="02070309020205020404" pitchFamily="49" charset="0"/>
-                <a:cs typeface="Courier New" panose="02070309020205020404" pitchFamily="49" charset="0"/>
-              </a:rPr>
-              <a:t>)</a:t>
-            </a:r>
-            <a:br>
-              <a:rPr kumimoji="0" lang="nl-NL" altLang="nl-NL" sz="1000" b="0" i="0" u="none" strike="noStrike" cap="none" normalizeH="0" baseline="0" smtClean="0">
-                <a:ln>
-                  <a:noFill/>
-                </a:ln>
-                <a:solidFill>
-                  <a:srgbClr val="000000"/>
-                </a:solidFill>
-                <a:effectLst/>
-                <a:latin typeface="Courier New" panose="02070309020205020404" pitchFamily="49" charset="0"/>
-                <a:cs typeface="Courier New" panose="02070309020205020404" pitchFamily="49" charset="0"/>
-              </a:rPr>
-            </a:br>
-            <a:r>
-              <a:rPr kumimoji="0" lang="nl-NL" altLang="nl-NL" sz="1000" b="0" i="0" u="none" strike="noStrike" cap="none" normalizeH="0" baseline="0" smtClean="0">
-                <a:ln>
-                  <a:noFill/>
-                </a:ln>
-                <a:solidFill>
-                  <a:srgbClr val="000000"/>
-                </a:solidFill>
-                <a:effectLst/>
-                <a:latin typeface="Courier New" panose="02070309020205020404" pitchFamily="49" charset="0"/>
-                <a:cs typeface="Courier New" panose="02070309020205020404" pitchFamily="49" charset="0"/>
-              </a:rPr>
-              <a:t>        {</a:t>
-            </a:r>
-            <a:br>
-              <a:rPr kumimoji="0" lang="nl-NL" altLang="nl-NL" sz="1000" b="0" i="0" u="none" strike="noStrike" cap="none" normalizeH="0" baseline="0" smtClean="0">
-                <a:ln>
-                  <a:noFill/>
-                </a:ln>
-                <a:solidFill>
-                  <a:srgbClr val="000000"/>
-                </a:solidFill>
-                <a:effectLst/>
-                <a:latin typeface="Courier New" panose="02070309020205020404" pitchFamily="49" charset="0"/>
-                <a:cs typeface="Courier New" panose="02070309020205020404" pitchFamily="49" charset="0"/>
-              </a:rPr>
-            </a:br>
-            <a:r>
-              <a:rPr kumimoji="0" lang="nl-NL" altLang="nl-NL" sz="1000" b="0" i="0" u="none" strike="noStrike" cap="none" normalizeH="0" baseline="0" smtClean="0">
-                <a:ln>
-                  <a:noFill/>
-                </a:ln>
-                <a:solidFill>
-                  <a:srgbClr val="000000"/>
-                </a:solidFill>
-                <a:effectLst/>
-                <a:latin typeface="Courier New" panose="02070309020205020404" pitchFamily="49" charset="0"/>
-                <a:cs typeface="Courier New" panose="02070309020205020404" pitchFamily="49" charset="0"/>
-              </a:rPr>
-              <a:t>            current.rotateRight();</a:t>
-            </a:r>
-            <a:br>
-              <a:rPr kumimoji="0" lang="nl-NL" altLang="nl-NL" sz="1000" b="0" i="0" u="none" strike="noStrike" cap="none" normalizeH="0" baseline="0" smtClean="0">
-                <a:ln>
-                  <a:noFill/>
-                </a:ln>
-                <a:solidFill>
-                  <a:srgbClr val="000000"/>
-                </a:solidFill>
-                <a:effectLst/>
-                <a:latin typeface="Courier New" panose="02070309020205020404" pitchFamily="49" charset="0"/>
-                <a:cs typeface="Courier New" panose="02070309020205020404" pitchFamily="49" charset="0"/>
-              </a:rPr>
-            </a:br>
-            <a:r>
-              <a:rPr kumimoji="0" lang="nl-NL" altLang="nl-NL" sz="1000" b="0" i="0" u="none" strike="noStrike" cap="none" normalizeH="0" baseline="0" smtClean="0">
-                <a:ln>
-                  <a:noFill/>
-                </a:ln>
-                <a:solidFill>
-                  <a:srgbClr val="000000"/>
-                </a:solidFill>
-                <a:effectLst/>
-                <a:latin typeface="Courier New" panose="02070309020205020404" pitchFamily="49" charset="0"/>
-                <a:cs typeface="Courier New" panose="02070309020205020404" pitchFamily="49" charset="0"/>
-              </a:rPr>
-              <a:t>        } </a:t>
-            </a:r>
-            <a:r>
-              <a:rPr kumimoji="0" lang="nl-NL" altLang="nl-NL" sz="1000" b="1" i="0" u="none" strike="noStrike" cap="none" normalizeH="0" baseline="0" smtClean="0">
-                <a:ln>
-                  <a:noFill/>
-                </a:ln>
-                <a:solidFill>
-                  <a:srgbClr val="000080"/>
-                </a:solidFill>
-                <a:effectLst/>
-                <a:latin typeface="Courier New" panose="02070309020205020404" pitchFamily="49" charset="0"/>
-                <a:cs typeface="Courier New" panose="02070309020205020404" pitchFamily="49" charset="0"/>
-              </a:rPr>
-              <a:t>else if </a:t>
-            </a:r>
-            <a:r>
-              <a:rPr kumimoji="0" lang="nl-NL" altLang="nl-NL" sz="1000" b="0" i="0" u="none" strike="noStrike" cap="none" normalizeH="0" baseline="0" smtClean="0">
-                <a:ln>
-                  <a:noFill/>
-                </a:ln>
-                <a:solidFill>
-                  <a:srgbClr val="000000"/>
-                </a:solidFill>
-                <a:effectLst/>
-                <a:latin typeface="Courier New" panose="02070309020205020404" pitchFamily="49" charset="0"/>
-                <a:cs typeface="Courier New" panose="02070309020205020404" pitchFamily="49" charset="0"/>
-              </a:rPr>
-              <a:t>(balanceFactor &lt; - </a:t>
-            </a:r>
-            <a:r>
-              <a:rPr kumimoji="0" lang="nl-NL" altLang="nl-NL" sz="1000" b="0" i="0" u="none" strike="noStrike" cap="none" normalizeH="0" baseline="0" smtClean="0">
-                <a:ln>
-                  <a:noFill/>
-                </a:ln>
-                <a:solidFill>
-                  <a:srgbClr val="0000FF"/>
-                </a:solidFill>
-                <a:effectLst/>
-                <a:latin typeface="Courier New" panose="02070309020205020404" pitchFamily="49" charset="0"/>
-                <a:cs typeface="Courier New" panose="02070309020205020404" pitchFamily="49" charset="0"/>
-              </a:rPr>
-              <a:t>1</a:t>
-            </a:r>
-            <a:r>
-              <a:rPr kumimoji="0" lang="nl-NL" altLang="nl-NL" sz="1000" b="0" i="0" u="none" strike="noStrike" cap="none" normalizeH="0" baseline="0" smtClean="0">
-                <a:ln>
-                  <a:noFill/>
-                </a:ln>
-                <a:solidFill>
-                  <a:srgbClr val="000000"/>
-                </a:solidFill>
-                <a:effectLst/>
-                <a:latin typeface="Courier New" panose="02070309020205020404" pitchFamily="49" charset="0"/>
-                <a:cs typeface="Courier New" panose="02070309020205020404" pitchFamily="49" charset="0"/>
-              </a:rPr>
-              <a:t>)</a:t>
-            </a:r>
-            <a:br>
-              <a:rPr kumimoji="0" lang="nl-NL" altLang="nl-NL" sz="1000" b="0" i="0" u="none" strike="noStrike" cap="none" normalizeH="0" baseline="0" smtClean="0">
-                <a:ln>
-                  <a:noFill/>
-                </a:ln>
-                <a:solidFill>
-                  <a:srgbClr val="000000"/>
-                </a:solidFill>
-                <a:effectLst/>
-                <a:latin typeface="Courier New" panose="02070309020205020404" pitchFamily="49" charset="0"/>
-                <a:cs typeface="Courier New" panose="02070309020205020404" pitchFamily="49" charset="0"/>
-              </a:rPr>
-            </a:br>
-            <a:r>
-              <a:rPr kumimoji="0" lang="nl-NL" altLang="nl-NL" sz="1000" b="0" i="0" u="none" strike="noStrike" cap="none" normalizeH="0" baseline="0" smtClean="0">
-                <a:ln>
-                  <a:noFill/>
-                </a:ln>
-                <a:solidFill>
-                  <a:srgbClr val="000000"/>
-                </a:solidFill>
-                <a:effectLst/>
-                <a:latin typeface="Courier New" panose="02070309020205020404" pitchFamily="49" charset="0"/>
-                <a:cs typeface="Courier New" panose="02070309020205020404" pitchFamily="49" charset="0"/>
-              </a:rPr>
-              <a:t>        {</a:t>
-            </a:r>
-            <a:br>
-              <a:rPr kumimoji="0" lang="nl-NL" altLang="nl-NL" sz="1000" b="0" i="0" u="none" strike="noStrike" cap="none" normalizeH="0" baseline="0" smtClean="0">
-                <a:ln>
-                  <a:noFill/>
-                </a:ln>
-                <a:solidFill>
-                  <a:srgbClr val="000000"/>
-                </a:solidFill>
-                <a:effectLst/>
-                <a:latin typeface="Courier New" panose="02070309020205020404" pitchFamily="49" charset="0"/>
-                <a:cs typeface="Courier New" panose="02070309020205020404" pitchFamily="49" charset="0"/>
-              </a:rPr>
-            </a:br>
-            <a:r>
-              <a:rPr kumimoji="0" lang="nl-NL" altLang="nl-NL" sz="1000" b="0" i="0" u="none" strike="noStrike" cap="none" normalizeH="0" baseline="0" smtClean="0">
-                <a:ln>
-                  <a:noFill/>
-                </a:ln>
-                <a:solidFill>
-                  <a:srgbClr val="000000"/>
-                </a:solidFill>
-                <a:effectLst/>
-                <a:latin typeface="Courier New" panose="02070309020205020404" pitchFamily="49" charset="0"/>
-                <a:cs typeface="Courier New" panose="02070309020205020404" pitchFamily="49" charset="0"/>
-              </a:rPr>
-              <a:t>            current.rotateLeft();</a:t>
-            </a:r>
-            <a:br>
-              <a:rPr kumimoji="0" lang="nl-NL" altLang="nl-NL" sz="1000" b="0" i="0" u="none" strike="noStrike" cap="none" normalizeH="0" baseline="0" smtClean="0">
-                <a:ln>
-                  <a:noFill/>
-                </a:ln>
-                <a:solidFill>
-                  <a:srgbClr val="000000"/>
-                </a:solidFill>
-                <a:effectLst/>
-                <a:latin typeface="Courier New" panose="02070309020205020404" pitchFamily="49" charset="0"/>
-                <a:cs typeface="Courier New" panose="02070309020205020404" pitchFamily="49" charset="0"/>
-              </a:rPr>
-            </a:br>
-            <a:r>
-              <a:rPr kumimoji="0" lang="nl-NL" altLang="nl-NL" sz="1000" b="0" i="0" u="none" strike="noStrike" cap="none" normalizeH="0" baseline="0" smtClean="0">
-                <a:ln>
-                  <a:noFill/>
-                </a:ln>
-                <a:solidFill>
-                  <a:srgbClr val="000000"/>
-                </a:solidFill>
-                <a:effectLst/>
-                <a:latin typeface="Courier New" panose="02070309020205020404" pitchFamily="49" charset="0"/>
-                <a:cs typeface="Courier New" panose="02070309020205020404" pitchFamily="49" charset="0"/>
-              </a:rPr>
-              <a:t>        }</a:t>
-            </a:r>
-            <a:br>
-              <a:rPr kumimoji="0" lang="nl-NL" altLang="nl-NL" sz="1000" b="0" i="0" u="none" strike="noStrike" cap="none" normalizeH="0" baseline="0" smtClean="0">
-                <a:ln>
-                  <a:noFill/>
-                </a:ln>
-                <a:solidFill>
-                  <a:srgbClr val="000000"/>
-                </a:solidFill>
-                <a:effectLst/>
-                <a:latin typeface="Courier New" panose="02070309020205020404" pitchFamily="49" charset="0"/>
-                <a:cs typeface="Courier New" panose="02070309020205020404" pitchFamily="49" charset="0"/>
-              </a:rPr>
-            </a:br>
-            <a:r>
-              <a:rPr kumimoji="0" lang="nl-NL" altLang="nl-NL" sz="1000" b="0" i="0" u="none" strike="noStrike" cap="none" normalizeH="0" baseline="0" smtClean="0">
-                <a:ln>
-                  <a:noFill/>
-                </a:ln>
-                <a:solidFill>
-                  <a:srgbClr val="000000"/>
-                </a:solidFill>
-                <a:effectLst/>
-                <a:latin typeface="Courier New" panose="02070309020205020404" pitchFamily="49" charset="0"/>
-                <a:cs typeface="Courier New" panose="02070309020205020404" pitchFamily="49" charset="0"/>
-              </a:rPr>
-              <a:t>        current = current.</a:t>
-            </a:r>
-            <a:r>
-              <a:rPr kumimoji="0" lang="nl-NL" altLang="nl-NL" sz="1000" b="1" i="0" u="none" strike="noStrike" cap="none" normalizeH="0" baseline="0" smtClean="0">
-                <a:ln>
-                  <a:noFill/>
-                </a:ln>
-                <a:solidFill>
-                  <a:srgbClr val="660E7A"/>
-                </a:solidFill>
-                <a:effectLst/>
-                <a:latin typeface="Courier New" panose="02070309020205020404" pitchFamily="49" charset="0"/>
-                <a:cs typeface="Courier New" panose="02070309020205020404" pitchFamily="49" charset="0"/>
-              </a:rPr>
-              <a:t>parent</a:t>
-            </a:r>
-            <a:r>
-              <a:rPr kumimoji="0" lang="nl-NL" altLang="nl-NL" sz="1000" b="0" i="0" u="none" strike="noStrike" cap="none" normalizeH="0" baseline="0" smtClean="0">
-                <a:ln>
-                  <a:noFill/>
-                </a:ln>
-                <a:solidFill>
-                  <a:srgbClr val="000000"/>
-                </a:solidFill>
-                <a:effectLst/>
-                <a:latin typeface="Courier New" panose="02070309020205020404" pitchFamily="49" charset="0"/>
-                <a:cs typeface="Courier New" panose="02070309020205020404" pitchFamily="49" charset="0"/>
-              </a:rPr>
-              <a:t>;</a:t>
-            </a:r>
-            <a:br>
-              <a:rPr kumimoji="0" lang="nl-NL" altLang="nl-NL" sz="1000" b="0" i="0" u="none" strike="noStrike" cap="none" normalizeH="0" baseline="0" smtClean="0">
-                <a:ln>
-                  <a:noFill/>
-                </a:ln>
-                <a:solidFill>
-                  <a:srgbClr val="000000"/>
-                </a:solidFill>
-                <a:effectLst/>
-                <a:latin typeface="Courier New" panose="02070309020205020404" pitchFamily="49" charset="0"/>
-                <a:cs typeface="Courier New" panose="02070309020205020404" pitchFamily="49" charset="0"/>
-              </a:rPr>
-            </a:br>
-            <a:r>
-              <a:rPr kumimoji="0" lang="nl-NL" altLang="nl-NL" sz="1000" b="0" i="0" u="none" strike="noStrike" cap="none" normalizeH="0" baseline="0" smtClean="0">
-                <a:ln>
-                  <a:noFill/>
-                </a:ln>
-                <a:solidFill>
-                  <a:srgbClr val="000000"/>
-                </a:solidFill>
-                <a:effectLst/>
-                <a:latin typeface="Courier New" panose="02070309020205020404" pitchFamily="49" charset="0"/>
-                <a:cs typeface="Courier New" panose="02070309020205020404" pitchFamily="49" charset="0"/>
-              </a:rPr>
-              <a:t>    }</a:t>
-            </a:r>
-            <a:br>
-              <a:rPr kumimoji="0" lang="nl-NL" altLang="nl-NL" sz="1000" b="0" i="0" u="none" strike="noStrike" cap="none" normalizeH="0" baseline="0" smtClean="0">
-                <a:ln>
-                  <a:noFill/>
-                </a:ln>
-                <a:solidFill>
-                  <a:srgbClr val="000000"/>
-                </a:solidFill>
-                <a:effectLst/>
-                <a:latin typeface="Courier New" panose="02070309020205020404" pitchFamily="49" charset="0"/>
-                <a:cs typeface="Courier New" panose="02070309020205020404" pitchFamily="49" charset="0"/>
-              </a:rPr>
-            </a:br>
-            <a:r>
-              <a:rPr kumimoji="0" lang="nl-NL" altLang="nl-NL" sz="1000" b="0" i="0" u="none" strike="noStrike" cap="none" normalizeH="0" baseline="0" smtClean="0">
-                <a:ln>
-                  <a:noFill/>
-                </a:ln>
-                <a:solidFill>
-                  <a:srgbClr val="000000"/>
-                </a:solidFill>
-                <a:effectLst/>
-                <a:latin typeface="Courier New" panose="02070309020205020404" pitchFamily="49" charset="0"/>
-                <a:cs typeface="Courier New" panose="02070309020205020404" pitchFamily="49" charset="0"/>
-              </a:rPr>
-              <a:t>    </a:t>
-            </a:r>
-            <a:r>
-              <a:rPr kumimoji="0" lang="nl-NL" altLang="nl-NL" sz="1000" b="1" i="0" u="none" strike="noStrike" cap="none" normalizeH="0" baseline="0" smtClean="0">
-                <a:ln>
-                  <a:noFill/>
-                </a:ln>
-                <a:solidFill>
-                  <a:srgbClr val="000080"/>
-                </a:solidFill>
-                <a:effectLst/>
-                <a:latin typeface="Courier New" panose="02070309020205020404" pitchFamily="49" charset="0"/>
-                <a:cs typeface="Courier New" panose="02070309020205020404" pitchFamily="49" charset="0"/>
-              </a:rPr>
-              <a:t>while</a:t>
-            </a:r>
-            <a:r>
-              <a:rPr kumimoji="0" lang="nl-NL" altLang="nl-NL" sz="1000" b="0" i="0" u="none" strike="noStrike" cap="none" normalizeH="0" baseline="0" smtClean="0">
-                <a:ln>
-                  <a:noFill/>
-                </a:ln>
-                <a:solidFill>
-                  <a:srgbClr val="000000"/>
-                </a:solidFill>
-                <a:effectLst/>
-                <a:latin typeface="Courier New" panose="02070309020205020404" pitchFamily="49" charset="0"/>
-                <a:cs typeface="Courier New" panose="02070309020205020404" pitchFamily="49" charset="0"/>
-              </a:rPr>
-              <a:t>(getRoot().topDownBalance());</a:t>
-            </a:r>
-            <a:br>
-              <a:rPr kumimoji="0" lang="nl-NL" altLang="nl-NL" sz="1000" b="0" i="0" u="none" strike="noStrike" cap="none" normalizeH="0" baseline="0" smtClean="0">
-                <a:ln>
-                  <a:noFill/>
-                </a:ln>
-                <a:solidFill>
-                  <a:srgbClr val="000000"/>
-                </a:solidFill>
-                <a:effectLst/>
-                <a:latin typeface="Courier New" panose="02070309020205020404" pitchFamily="49" charset="0"/>
-                <a:cs typeface="Courier New" panose="02070309020205020404" pitchFamily="49" charset="0"/>
-              </a:rPr>
-            </a:br>
-            <a:r>
-              <a:rPr kumimoji="0" lang="nl-NL" altLang="nl-NL" sz="1000" b="0" i="0" u="none" strike="noStrike" cap="none" normalizeH="0" baseline="0" smtClean="0">
-                <a:ln>
-                  <a:noFill/>
-                </a:ln>
-                <a:solidFill>
-                  <a:srgbClr val="000000"/>
-                </a:solidFill>
-                <a:effectLst/>
-                <a:latin typeface="Courier New" panose="02070309020205020404" pitchFamily="49" charset="0"/>
-                <a:cs typeface="Courier New" panose="02070309020205020404" pitchFamily="49" charset="0"/>
-              </a:rPr>
-              <a:t>}</a:t>
-            </a:r>
-            <a:endParaRPr kumimoji="0" lang="nl-NL" altLang="nl-NL" sz="1800" b="0" i="0" u="none" strike="noStrike" cap="none" normalizeH="0" baseline="0" smtClean="0">
-              <a:ln>
-                <a:noFill/>
-              </a:ln>
-              <a:solidFill>
-                <a:schemeClr val="tx1"/>
-              </a:solidFill>
-              <a:effectLst/>
-              <a:latin typeface="Arial" panose="020B0604020202020204" pitchFamily="34" charset="0"/>
-            </a:endParaRPr>
-          </a:p>
-        </p:txBody>
-      </p:sp>
-    </p:spTree>
-    <p:extLst>
-      <p:ext uri="{BB962C8B-B14F-4D97-AF65-F5344CB8AC3E}">
-        <p14:creationId xmlns:p14="http://schemas.microsoft.com/office/powerpoint/2010/main" val="1351245975"/>
-      </p:ext>
-    </p:extLst>
-  </p:cSld>
-  <p:clrMapOvr>
-    <a:masterClrMapping/>
-  </p:clrMapOvr>
-  <p:timing>
-    <p:tnLst>
-      <p:par>
-        <p:cTn id="1" dur="indefinite" restart="never" nodeType="tmRoot"/>
-      </p:par>
-    </p:tnLst>
-  </p:timing>
-</p:sld>
-</file>
-
-<file path=ppt/slides/slide7.xml><?xml version="1.0" encoding="utf-8"?>
 <p:sld xmlns:a="http://schemas.openxmlformats.org/drawingml/2006/main" xmlns:r="http://schemas.openxmlformats.org/officeDocument/2006/relationships" xmlns:p="http://schemas.openxmlformats.org/presentationml/2006/main">
   <p:cSld>
     <p:spTree>

</xml_diff>